<commit_message>
Adding basic slide for scetion 4 and 5
</commit_message>
<xml_diff>
--- a/AI_NangCao/slide/slide.pptx
+++ b/AI_NangCao/slide/slide.pptx
@@ -5,7 +5,7 @@
     <p:sldMasterId id="2147483648" r:id="rId1"/>
   </p:sldMasterIdLst>
   <p:notesMasterIdLst>
-    <p:notesMasterId r:id="rId29"/>
+    <p:notesMasterId r:id="rId30"/>
   </p:notesMasterIdLst>
   <p:sldIdLst>
     <p:sldId id="256" r:id="rId2"/>
@@ -30,11 +30,12 @@
     <p:sldId id="291" r:id="rId21"/>
     <p:sldId id="297" r:id="rId22"/>
     <p:sldId id="283" r:id="rId23"/>
-    <p:sldId id="284" r:id="rId24"/>
-    <p:sldId id="285" r:id="rId25"/>
-    <p:sldId id="286" r:id="rId26"/>
-    <p:sldId id="287" r:id="rId27"/>
-    <p:sldId id="262" r:id="rId28"/>
+    <p:sldId id="298" r:id="rId24"/>
+    <p:sldId id="299" r:id="rId25"/>
+    <p:sldId id="285" r:id="rId26"/>
+    <p:sldId id="286" r:id="rId27"/>
+    <p:sldId id="287" r:id="rId28"/>
+    <p:sldId id="262" r:id="rId29"/>
   </p:sldIdLst>
   <p:sldSz cx="12192000" cy="6858000"/>
   <p:notesSz cx="6858000" cy="9144000"/>
@@ -2095,6 +2096,13 @@
         </dgm:presLayoutVars>
       </dgm:prSet>
       <dgm:spPr/>
+      <dgm:t>
+        <a:bodyPr/>
+        <a:lstStyle/>
+        <a:p>
+          <a:endParaRPr lang="en-US"/>
+        </a:p>
+      </dgm:t>
     </dgm:pt>
     <dgm:pt modelId="{63873F1F-FC88-4DD8-968E-F2AA092439B5}" type="pres">
       <dgm:prSet presAssocID="{579DE623-2DF7-4243-B639-4C6C471378C7}" presName="parentText" presStyleLbl="node1" presStyleIdx="0" presStyleCnt="6">
@@ -2104,6 +2112,13 @@
         </dgm:presLayoutVars>
       </dgm:prSet>
       <dgm:spPr/>
+      <dgm:t>
+        <a:bodyPr/>
+        <a:lstStyle/>
+        <a:p>
+          <a:endParaRPr lang="en-US"/>
+        </a:p>
+      </dgm:t>
     </dgm:pt>
     <dgm:pt modelId="{80493837-3E0A-4555-B12F-8E6F34631BAC}" type="pres">
       <dgm:prSet presAssocID="{55E825B2-76A9-4760-B3AA-4F41A5B6BC15}" presName="spacer" presStyleCnt="0"/>
@@ -2117,6 +2132,13 @@
         </dgm:presLayoutVars>
       </dgm:prSet>
       <dgm:spPr/>
+      <dgm:t>
+        <a:bodyPr/>
+        <a:lstStyle/>
+        <a:p>
+          <a:endParaRPr lang="en-US"/>
+        </a:p>
+      </dgm:t>
     </dgm:pt>
     <dgm:pt modelId="{CAB4BC8E-8AE6-4BAA-BB92-32952284E077}" type="pres">
       <dgm:prSet presAssocID="{964D2CCA-0E6A-4E0B-8CF5-7A877815F789}" presName="spacer" presStyleCnt="0"/>
@@ -2130,6 +2152,13 @@
         </dgm:presLayoutVars>
       </dgm:prSet>
       <dgm:spPr/>
+      <dgm:t>
+        <a:bodyPr/>
+        <a:lstStyle/>
+        <a:p>
+          <a:endParaRPr lang="en-US"/>
+        </a:p>
+      </dgm:t>
     </dgm:pt>
     <dgm:pt modelId="{346956EB-DAFD-4105-B297-9B79D8D0D6EC}" type="pres">
       <dgm:prSet presAssocID="{8BF41E44-03D2-4DB8-837A-DFEDC750EA84}" presName="spacer" presStyleCnt="0"/>
@@ -2143,6 +2172,13 @@
         </dgm:presLayoutVars>
       </dgm:prSet>
       <dgm:spPr/>
+      <dgm:t>
+        <a:bodyPr/>
+        <a:lstStyle/>
+        <a:p>
+          <a:endParaRPr lang="en-US"/>
+        </a:p>
+      </dgm:t>
     </dgm:pt>
     <dgm:pt modelId="{F2BFC20D-E3A6-482D-AC74-CA12751361F9}" type="pres">
       <dgm:prSet presAssocID="{1DA16861-22A3-4489-B3D3-3326CB300FE5}" presName="spacer" presStyleCnt="0"/>
@@ -2156,6 +2192,13 @@
         </dgm:presLayoutVars>
       </dgm:prSet>
       <dgm:spPr/>
+      <dgm:t>
+        <a:bodyPr/>
+        <a:lstStyle/>
+        <a:p>
+          <a:endParaRPr lang="en-US"/>
+        </a:p>
+      </dgm:t>
     </dgm:pt>
     <dgm:pt modelId="{BBD4782D-1DCB-47A6-A2C6-14297F7B1AF2}" type="pres">
       <dgm:prSet presAssocID="{7ADABF86-25B4-4F65-A008-0769FF9AA74A}" presName="spacer" presStyleCnt="0"/>
@@ -2169,22 +2212,29 @@
         </dgm:presLayoutVars>
       </dgm:prSet>
       <dgm:spPr/>
+      <dgm:t>
+        <a:bodyPr/>
+        <a:lstStyle/>
+        <a:p>
+          <a:endParaRPr lang="en-US"/>
+        </a:p>
+      </dgm:t>
     </dgm:pt>
   </dgm:ptLst>
   <dgm:cxnLst>
+    <dgm:cxn modelId="{0D747358-964C-42A5-AB78-AB2470A76628}" type="presOf" srcId="{C0545705-5A66-47FD-9F7E-B3C74046757D}" destId="{448D9771-D820-422B-8814-4B49E9F0B3E4}" srcOrd="0" destOrd="0" presId="urn:microsoft.com/office/officeart/2005/8/layout/vList2"/>
+    <dgm:cxn modelId="{35533BD5-3E96-4262-AB1E-4D6A87E237D4}" srcId="{370738E6-4BD7-4AB8-8B0D-3205B8ECCD3B}" destId="{9CC66A01-3875-4532-BFEA-D42ED9A50BEC}" srcOrd="3" destOrd="0" parTransId="{6C452C3A-B980-4971-8D83-2C0603A8D514}" sibTransId="{1DA16861-22A3-4489-B3D3-3326CB300FE5}"/>
     <dgm:cxn modelId="{2C7D7505-A7E9-40CE-918A-B74B3FA32440}" type="presOf" srcId="{579DE623-2DF7-4243-B639-4C6C471378C7}" destId="{63873F1F-FC88-4DD8-968E-F2AA092439B5}" srcOrd="0" destOrd="0" presId="urn:microsoft.com/office/officeart/2005/8/layout/vList2"/>
+    <dgm:cxn modelId="{3D8B3FA4-3148-47CE-BABE-E743EE8F4F6B}" type="presOf" srcId="{9CC66A01-3875-4532-BFEA-D42ED9A50BEC}" destId="{8A53429E-C067-46EC-8557-6BCED9E82F13}" srcOrd="0" destOrd="0" presId="urn:microsoft.com/office/officeart/2005/8/layout/vList2"/>
+    <dgm:cxn modelId="{16334227-9D68-4129-9592-9E200DF40EB1}" type="presOf" srcId="{A1B9B704-37BA-4A21-AE6B-5F9947CFE2A4}" destId="{B5E99E5D-154F-4F61-B40A-662560417B3B}" srcOrd="0" destOrd="0" presId="urn:microsoft.com/office/officeart/2005/8/layout/vList2"/>
+    <dgm:cxn modelId="{0ACBACC0-4F1E-497E-B786-032F73DF1751}" srcId="{370738E6-4BD7-4AB8-8B0D-3205B8ECCD3B}" destId="{C0545705-5A66-47FD-9F7E-B3C74046757D}" srcOrd="1" destOrd="0" parTransId="{A314F2AF-FDE1-4A17-B0E8-F64B2E85B49C}" sibTransId="{964D2CCA-0E6A-4E0B-8CF5-7A877815F789}"/>
     <dgm:cxn modelId="{2E30E005-F0D5-426A-B613-D0583B61309C}" srcId="{370738E6-4BD7-4AB8-8B0D-3205B8ECCD3B}" destId="{95801185-A32C-4391-8AC2-3FA4061E9EF3}" srcOrd="4" destOrd="0" parTransId="{1AACB10B-2033-4687-80EE-2081CF728F42}" sibTransId="{7ADABF86-25B4-4F65-A008-0769FF9AA74A}"/>
-    <dgm:cxn modelId="{16334227-9D68-4129-9592-9E200DF40EB1}" type="presOf" srcId="{A1B9B704-37BA-4A21-AE6B-5F9947CFE2A4}" destId="{B5E99E5D-154F-4F61-B40A-662560417B3B}" srcOrd="0" destOrd="0" presId="urn:microsoft.com/office/officeart/2005/8/layout/vList2"/>
-    <dgm:cxn modelId="{0D747358-964C-42A5-AB78-AB2470A76628}" type="presOf" srcId="{C0545705-5A66-47FD-9F7E-B3C74046757D}" destId="{448D9771-D820-422B-8814-4B49E9F0B3E4}" srcOrd="0" destOrd="0" presId="urn:microsoft.com/office/officeart/2005/8/layout/vList2"/>
     <dgm:cxn modelId="{D4D40979-0EAF-4C98-887C-16A5C398BE70}" srcId="{370738E6-4BD7-4AB8-8B0D-3205B8ECCD3B}" destId="{579DE623-2DF7-4243-B639-4C6C471378C7}" srcOrd="0" destOrd="0" parTransId="{BE7C2772-D163-45BD-99AF-8D4E99C1357E}" sibTransId="{55E825B2-76A9-4760-B3AA-4F41A5B6BC15}"/>
-    <dgm:cxn modelId="{3D8B3FA4-3148-47CE-BABE-E743EE8F4F6B}" type="presOf" srcId="{9CC66A01-3875-4532-BFEA-D42ED9A50BEC}" destId="{8A53429E-C067-46EC-8557-6BCED9E82F13}" srcOrd="0" destOrd="0" presId="urn:microsoft.com/office/officeart/2005/8/layout/vList2"/>
+    <dgm:cxn modelId="{A2AF86FE-31B9-4C90-B932-E8F7DA25448A}" type="presOf" srcId="{370738E6-4BD7-4AB8-8B0D-3205B8ECCD3B}" destId="{5C243920-1960-49F6-8B94-BFB30175097D}" srcOrd="0" destOrd="0" presId="urn:microsoft.com/office/officeart/2005/8/layout/vList2"/>
+    <dgm:cxn modelId="{672D52F2-A12B-4B6D-856F-7BB8B7B6E9DC}" srcId="{370738E6-4BD7-4AB8-8B0D-3205B8ECCD3B}" destId="{8406E4E1-49C4-47D4-93CE-4068A6100A4D}" srcOrd="2" destOrd="0" parTransId="{15EFCEDF-13DC-4E26-8505-4FA59E4EA122}" sibTransId="{8BF41E44-03D2-4DB8-837A-DFEDC750EA84}"/>
+    <dgm:cxn modelId="{02B519EE-E980-4A77-A3A4-7BB6F267D693}" srcId="{370738E6-4BD7-4AB8-8B0D-3205B8ECCD3B}" destId="{A1B9B704-37BA-4A21-AE6B-5F9947CFE2A4}" srcOrd="5" destOrd="0" parTransId="{18DCE097-6B39-4526-B537-55758D61C95A}" sibTransId="{A476D3E0-3311-4945-9D79-EB22980DB0E6}"/>
     <dgm:cxn modelId="{BA09CFBC-45B3-43A9-981A-5102E972A071}" type="presOf" srcId="{8406E4E1-49C4-47D4-93CE-4068A6100A4D}" destId="{D282F9DC-D542-4AD5-958F-1B5DF45D0032}" srcOrd="0" destOrd="0" presId="urn:microsoft.com/office/officeart/2005/8/layout/vList2"/>
-    <dgm:cxn modelId="{0ACBACC0-4F1E-497E-B786-032F73DF1751}" srcId="{370738E6-4BD7-4AB8-8B0D-3205B8ECCD3B}" destId="{C0545705-5A66-47FD-9F7E-B3C74046757D}" srcOrd="1" destOrd="0" parTransId="{A314F2AF-FDE1-4A17-B0E8-F64B2E85B49C}" sibTransId="{964D2CCA-0E6A-4E0B-8CF5-7A877815F789}"/>
-    <dgm:cxn modelId="{35533BD5-3E96-4262-AB1E-4D6A87E237D4}" srcId="{370738E6-4BD7-4AB8-8B0D-3205B8ECCD3B}" destId="{9CC66A01-3875-4532-BFEA-D42ED9A50BEC}" srcOrd="3" destOrd="0" parTransId="{6C452C3A-B980-4971-8D83-2C0603A8D514}" sibTransId="{1DA16861-22A3-4489-B3D3-3326CB300FE5}"/>
     <dgm:cxn modelId="{264A7DD6-7BC2-4314-963A-E4165AF0E53C}" type="presOf" srcId="{95801185-A32C-4391-8AC2-3FA4061E9EF3}" destId="{F6E9B1F4-2992-4675-92AA-E2AEE6AC9211}" srcOrd="0" destOrd="0" presId="urn:microsoft.com/office/officeart/2005/8/layout/vList2"/>
-    <dgm:cxn modelId="{02B519EE-E980-4A77-A3A4-7BB6F267D693}" srcId="{370738E6-4BD7-4AB8-8B0D-3205B8ECCD3B}" destId="{A1B9B704-37BA-4A21-AE6B-5F9947CFE2A4}" srcOrd="5" destOrd="0" parTransId="{18DCE097-6B39-4526-B537-55758D61C95A}" sibTransId="{A476D3E0-3311-4945-9D79-EB22980DB0E6}"/>
-    <dgm:cxn modelId="{672D52F2-A12B-4B6D-856F-7BB8B7B6E9DC}" srcId="{370738E6-4BD7-4AB8-8B0D-3205B8ECCD3B}" destId="{8406E4E1-49C4-47D4-93CE-4068A6100A4D}" srcOrd="2" destOrd="0" parTransId="{15EFCEDF-13DC-4E26-8505-4FA59E4EA122}" sibTransId="{8BF41E44-03D2-4DB8-837A-DFEDC750EA84}"/>
-    <dgm:cxn modelId="{A2AF86FE-31B9-4C90-B932-E8F7DA25448A}" type="presOf" srcId="{370738E6-4BD7-4AB8-8B0D-3205B8ECCD3B}" destId="{5C243920-1960-49F6-8B94-BFB30175097D}" srcOrd="0" destOrd="0" presId="urn:microsoft.com/office/officeart/2005/8/layout/vList2"/>
     <dgm:cxn modelId="{F74642ED-D2F0-4F95-8265-D7AC99131BA5}" type="presParOf" srcId="{5C243920-1960-49F6-8B94-BFB30175097D}" destId="{63873F1F-FC88-4DD8-968E-F2AA092439B5}" srcOrd="0" destOrd="0" presId="urn:microsoft.com/office/officeart/2005/8/layout/vList2"/>
     <dgm:cxn modelId="{14AA8D0F-8C38-4335-9A39-BEBF7F0821C8}" type="presParOf" srcId="{5C243920-1960-49F6-8B94-BFB30175097D}" destId="{80493837-3E0A-4555-B12F-8E6F34631BAC}" srcOrd="1" destOrd="0" presId="urn:microsoft.com/office/officeart/2005/8/layout/vList2"/>
     <dgm:cxn modelId="{1FD4269C-792E-45E6-A168-DC1A08F3C62B}" type="presParOf" srcId="{5C243920-1960-49F6-8B94-BFB30175097D}" destId="{448D9771-D820-422B-8814-4B49E9F0B3E4}" srcOrd="2" destOrd="0" presId="urn:microsoft.com/office/officeart/2005/8/layout/vList2"/>
@@ -2340,6 +2390,13 @@
         </dgm:presLayoutVars>
       </dgm:prSet>
       <dgm:spPr/>
+      <dgm:t>
+        <a:bodyPr/>
+        <a:lstStyle/>
+        <a:p>
+          <a:endParaRPr lang="en-US"/>
+        </a:p>
+      </dgm:t>
     </dgm:pt>
     <dgm:pt modelId="{97F231D8-EE3C-4107-9C4C-12F5083E154F}" type="pres">
       <dgm:prSet presAssocID="{17091DF7-1C0B-4D69-8972-9D84DF2D38FC}" presName="node" presStyleLbl="node1" presStyleIdx="0" presStyleCnt="3">
@@ -2348,6 +2405,13 @@
         </dgm:presLayoutVars>
       </dgm:prSet>
       <dgm:spPr/>
+      <dgm:t>
+        <a:bodyPr/>
+        <a:lstStyle/>
+        <a:p>
+          <a:endParaRPr lang="en-US"/>
+        </a:p>
+      </dgm:t>
     </dgm:pt>
     <dgm:pt modelId="{4CDCCC5C-0F13-4673-A495-6ABCA7F084E6}" type="pres">
       <dgm:prSet presAssocID="{60459FAB-10BA-415A-A6D6-019E0EAF22EA}" presName="sibTrans" presStyleCnt="0"/>
@@ -2360,6 +2424,13 @@
         </dgm:presLayoutVars>
       </dgm:prSet>
       <dgm:spPr/>
+      <dgm:t>
+        <a:bodyPr/>
+        <a:lstStyle/>
+        <a:p>
+          <a:endParaRPr lang="en-US"/>
+        </a:p>
+      </dgm:t>
     </dgm:pt>
     <dgm:pt modelId="{5B7B159F-9A7F-486F-BD6E-BF045278CCAE}" type="pres">
       <dgm:prSet presAssocID="{C296EEF8-C472-4796-95BC-5CB7CF9BBECC}" presName="sibTrans" presStyleCnt="0"/>
@@ -2372,16 +2443,23 @@
         </dgm:presLayoutVars>
       </dgm:prSet>
       <dgm:spPr/>
+      <dgm:t>
+        <a:bodyPr/>
+        <a:lstStyle/>
+        <a:p>
+          <a:endParaRPr lang="en-US"/>
+        </a:p>
+      </dgm:t>
     </dgm:pt>
   </dgm:ptLst>
   <dgm:cxnLst>
+    <dgm:cxn modelId="{90570F68-F608-4663-A885-9714AB7530D8}" type="presOf" srcId="{3D3168C0-EBF7-4602-8126-1AA3D07F5B77}" destId="{1EC35573-E55B-47C3-9D63-1A97D56B8698}" srcOrd="0" destOrd="0" presId="urn:microsoft.com/office/officeart/2005/8/layout/default"/>
     <dgm:cxn modelId="{DC940A19-FC34-4EB5-9D80-C2E0236D234C}" srcId="{E34EB61B-32C9-45B0-B118-0358901353A3}" destId="{3D3168C0-EBF7-4602-8126-1AA3D07F5B77}" srcOrd="1" destOrd="0" parTransId="{E96E1789-8805-452B-8246-26B250F03ECF}" sibTransId="{C296EEF8-C472-4796-95BC-5CB7CF9BBECC}"/>
-    <dgm:cxn modelId="{48598839-CB27-455B-A995-D8B7802829C7}" type="presOf" srcId="{E70528FF-B07F-4291-94A0-F95BD52B18FB}" destId="{C394CE5A-8C47-4285-BBBF-A204B98590ED}" srcOrd="0" destOrd="0" presId="urn:microsoft.com/office/officeart/2005/8/layout/default"/>
-    <dgm:cxn modelId="{831B0A3C-0101-4E2B-A3BC-53A0E8E4E296}" srcId="{E34EB61B-32C9-45B0-B118-0358901353A3}" destId="{E70528FF-B07F-4291-94A0-F95BD52B18FB}" srcOrd="2" destOrd="0" parTransId="{37F51D7E-54D5-407D-A4BD-D02D81F1C83F}" sibTransId="{E847C8AA-60AA-4D0F-A1E3-69F9C891C96C}"/>
-    <dgm:cxn modelId="{90570F68-F608-4663-A885-9714AB7530D8}" type="presOf" srcId="{3D3168C0-EBF7-4602-8126-1AA3D07F5B77}" destId="{1EC35573-E55B-47C3-9D63-1A97D56B8698}" srcOrd="0" destOrd="0" presId="urn:microsoft.com/office/officeart/2005/8/layout/default"/>
     <dgm:cxn modelId="{A69A7C50-DD62-4890-BA26-13E6604A4AC3}" srcId="{E34EB61B-32C9-45B0-B118-0358901353A3}" destId="{17091DF7-1C0B-4D69-8972-9D84DF2D38FC}" srcOrd="0" destOrd="0" parTransId="{C652D495-0B57-486B-B94D-244A09CD236C}" sibTransId="{60459FAB-10BA-415A-A6D6-019E0EAF22EA}"/>
     <dgm:cxn modelId="{914ED9C6-140E-466A-BBDA-6B09843545CD}" type="presOf" srcId="{17091DF7-1C0B-4D69-8972-9D84DF2D38FC}" destId="{97F231D8-EE3C-4107-9C4C-12F5083E154F}" srcOrd="0" destOrd="0" presId="urn:microsoft.com/office/officeart/2005/8/layout/default"/>
     <dgm:cxn modelId="{EF52F8E9-DB6C-423D-9CA5-7C76043CC4D1}" type="presOf" srcId="{E34EB61B-32C9-45B0-B118-0358901353A3}" destId="{679A24E1-D378-4275-ADCF-DF2302C8FE9E}" srcOrd="0" destOrd="0" presId="urn:microsoft.com/office/officeart/2005/8/layout/default"/>
+    <dgm:cxn modelId="{48598839-CB27-455B-A995-D8B7802829C7}" type="presOf" srcId="{E70528FF-B07F-4291-94A0-F95BD52B18FB}" destId="{C394CE5A-8C47-4285-BBBF-A204B98590ED}" srcOrd="0" destOrd="0" presId="urn:microsoft.com/office/officeart/2005/8/layout/default"/>
+    <dgm:cxn modelId="{831B0A3C-0101-4E2B-A3BC-53A0E8E4E296}" srcId="{E34EB61B-32C9-45B0-B118-0358901353A3}" destId="{E70528FF-B07F-4291-94A0-F95BD52B18FB}" srcOrd="2" destOrd="0" parTransId="{37F51D7E-54D5-407D-A4BD-D02D81F1C83F}" sibTransId="{E847C8AA-60AA-4D0F-A1E3-69F9C891C96C}"/>
     <dgm:cxn modelId="{FA94FE5A-5049-498E-AA6E-7EDE1CB7009A}" type="presParOf" srcId="{679A24E1-D378-4275-ADCF-DF2302C8FE9E}" destId="{97F231D8-EE3C-4107-9C4C-12F5083E154F}" srcOrd="0" destOrd="0" presId="urn:microsoft.com/office/officeart/2005/8/layout/default"/>
     <dgm:cxn modelId="{86E75AD0-6A88-4935-B400-543DC0D7497E}" type="presParOf" srcId="{679A24E1-D378-4275-ADCF-DF2302C8FE9E}" destId="{4CDCCC5C-0F13-4673-A495-6ABCA7F084E6}" srcOrd="1" destOrd="0" presId="urn:microsoft.com/office/officeart/2005/8/layout/default"/>
     <dgm:cxn modelId="{CCF0491C-D691-4323-BB3C-117D91BC7CE4}" type="presParOf" srcId="{679A24E1-D378-4275-ADCF-DF2302C8FE9E}" destId="{1EC35573-E55B-47C3-9D63-1A97D56B8698}" srcOrd="2" destOrd="0" presId="urn:microsoft.com/office/officeart/2005/8/layout/default"/>
@@ -2466,7 +2544,7 @@
         </a:bodyPr>
         <a:lstStyle/>
         <a:p>
-          <a:pPr marL="0" lvl="0" indent="0" algn="l" defTabSz="1778000">
+          <a:pPr lvl="0" algn="l" defTabSz="1778000">
             <a:lnSpc>
               <a:spcPct val="90000"/>
             </a:lnSpc>
@@ -2476,7 +2554,6 @@
             <a:spcAft>
               <a:spcPct val="35000"/>
             </a:spcAft>
-            <a:buNone/>
           </a:pPr>
           <a:r>
             <a:rPr lang="en-US" sz="4000" b="1" kern="1200" dirty="0">
@@ -2552,7 +2629,7 @@
         </a:bodyPr>
         <a:lstStyle/>
         <a:p>
-          <a:pPr marL="0" lvl="0" indent="0" algn="l" defTabSz="1778000">
+          <a:pPr lvl="0" algn="l" defTabSz="1778000">
             <a:lnSpc>
               <a:spcPct val="90000"/>
             </a:lnSpc>
@@ -2562,7 +2639,6 @@
             <a:spcAft>
               <a:spcPct val="35000"/>
             </a:spcAft>
-            <a:buNone/>
           </a:pPr>
           <a:r>
             <a:rPr lang="en-US" sz="4000" b="1" kern="1200" dirty="0">
@@ -2649,7 +2725,7 @@
         </a:bodyPr>
         <a:lstStyle/>
         <a:p>
-          <a:pPr marL="0" lvl="0" indent="0" algn="l" defTabSz="1778000">
+          <a:pPr lvl="0" algn="l" defTabSz="1778000">
             <a:lnSpc>
               <a:spcPct val="90000"/>
             </a:lnSpc>
@@ -2659,7 +2735,6 @@
             <a:spcAft>
               <a:spcPct val="35000"/>
             </a:spcAft>
-            <a:buNone/>
           </a:pPr>
           <a:r>
             <a:rPr lang="en-US" sz="4000" b="1" i="0" kern="1200" dirty="0">
@@ -2739,7 +2814,7 @@
         </a:bodyPr>
         <a:lstStyle/>
         <a:p>
-          <a:pPr marL="0" lvl="0" indent="0" algn="l" defTabSz="1778000">
+          <a:pPr lvl="0" algn="l" defTabSz="1778000">
             <a:lnSpc>
               <a:spcPct val="90000"/>
             </a:lnSpc>
@@ -2749,7 +2824,6 @@
             <a:spcAft>
               <a:spcPct val="35000"/>
             </a:spcAft>
-            <a:buNone/>
           </a:pPr>
           <a:r>
             <a:rPr lang="en-US" sz="4000" b="1" kern="1200" dirty="0">
@@ -2825,7 +2899,7 @@
         </a:bodyPr>
         <a:lstStyle/>
         <a:p>
-          <a:pPr marL="0" lvl="0" indent="0" algn="l" defTabSz="1778000">
+          <a:pPr lvl="0" algn="l" defTabSz="1778000">
             <a:lnSpc>
               <a:spcPct val="90000"/>
             </a:lnSpc>
@@ -2835,7 +2909,6 @@
             <a:spcAft>
               <a:spcPct val="35000"/>
             </a:spcAft>
-            <a:buNone/>
           </a:pPr>
           <a:r>
             <a:rPr lang="en-US" sz="4000" b="1" kern="1200" dirty="0">
@@ -2908,7 +2981,7 @@
         </a:bodyPr>
         <a:lstStyle/>
         <a:p>
-          <a:pPr marL="0" lvl="0" indent="0" algn="l" defTabSz="1778000">
+          <a:pPr lvl="0" algn="l" defTabSz="1778000">
             <a:lnSpc>
               <a:spcPct val="90000"/>
             </a:lnSpc>
@@ -2918,7 +2991,6 @@
             <a:spcAft>
               <a:spcPct val="35000"/>
             </a:spcAft>
-            <a:buNone/>
           </a:pPr>
           <a:r>
             <a:rPr lang="en-US" sz="4000" b="1" kern="1200" dirty="0">
@@ -3000,7 +3072,7 @@
         </a:bodyPr>
         <a:lstStyle/>
         <a:p>
-          <a:pPr marL="0" lvl="0" indent="0" algn="ctr" defTabSz="1555750">
+          <a:pPr lvl="0" algn="ctr" defTabSz="1555750">
             <a:lnSpc>
               <a:spcPct val="90000"/>
             </a:lnSpc>
@@ -3010,7 +3082,6 @@
             <a:spcAft>
               <a:spcPct val="35000"/>
             </a:spcAft>
-            <a:buNone/>
           </a:pPr>
           <a:r>
             <a:rPr lang="en-US" sz="3500" kern="1200" dirty="0"/>
@@ -3077,7 +3148,7 @@
         </a:bodyPr>
         <a:lstStyle/>
         <a:p>
-          <a:pPr marL="0" lvl="0" indent="0" algn="ctr" defTabSz="1555750">
+          <a:pPr lvl="0" algn="ctr" defTabSz="1555750">
             <a:lnSpc>
               <a:spcPct val="90000"/>
             </a:lnSpc>
@@ -3087,7 +3158,6 @@
             <a:spcAft>
               <a:spcPct val="35000"/>
             </a:spcAft>
-            <a:buNone/>
           </a:pPr>
           <a:r>
             <a:rPr lang="en-US" sz="3500" kern="1200" dirty="0"/>
@@ -3154,7 +3224,7 @@
         </a:bodyPr>
         <a:lstStyle/>
         <a:p>
-          <a:pPr marL="0" lvl="0" indent="0" algn="ctr" defTabSz="1555750">
+          <a:pPr lvl="0" algn="ctr" defTabSz="1555750">
             <a:lnSpc>
               <a:spcPct val="90000"/>
             </a:lnSpc>
@@ -3164,7 +3234,6 @@
             <a:spcAft>
               <a:spcPct val="35000"/>
             </a:spcAft>
-            <a:buNone/>
           </a:pPr>
           <a:r>
             <a:rPr lang="en-US" sz="3500" kern="1200" dirty="0"/>
@@ -5645,7 +5714,7 @@
           <a:p>
             <a:fld id="{B75E1771-A7B1-4A91-958F-4C50DD45F4D7}" type="datetimeFigureOut">
               <a:rPr lang="en-PH" smtClean="0"/>
-              <a:t>12/03/2021</a:t>
+              <a:t>13/03/2021</a:t>
             </a:fld>
             <a:endParaRPr lang="en-PH"/>
           </a:p>
@@ -9695,6 +9764,10 @@
               <a:rPr lang="en-US" dirty="0"/>
               <a:t>)</a:t>
             </a:r>
+            <a:r>
+              <a:rPr lang="vi-VN" dirty="0"/>
+              <a:t/>
+            </a:r>
             <a:br>
               <a:rPr lang="vi-VN" dirty="0"/>
             </a:br>
@@ -14281,6 +14354,981 @@
           <a:bodyPr/>
           <a:lstStyle/>
           <a:p>
+            <a:r>
+              <a:rPr lang="en-US" sz="1200" b="1" i="0" kern="1200" dirty="0" err="1" smtClean="0">
+                <a:solidFill>
+                  <a:schemeClr val="tx1"/>
+                </a:solidFill>
+                <a:effectLst/>
+                <a:latin typeface="+mn-lt"/>
+                <a:ea typeface="+mn-ea"/>
+                <a:cs typeface="+mn-cs"/>
+              </a:rPr>
+              <a:t>AlexNet</a:t>
+            </a:r>
+            <a:r>
+              <a:rPr lang="en-US" sz="1200" b="0" i="0" kern="1200" dirty="0" smtClean="0">
+                <a:solidFill>
+                  <a:schemeClr val="tx1"/>
+                </a:solidFill>
+                <a:effectLst/>
+                <a:latin typeface="+mn-lt"/>
+                <a:ea typeface="+mn-ea"/>
+                <a:cs typeface="+mn-cs"/>
+              </a:rPr>
+              <a:t> là </a:t>
+            </a:r>
+            <a:r>
+              <a:rPr lang="en-US" sz="1200" b="0" i="0" kern="1200" dirty="0" err="1" smtClean="0">
+                <a:solidFill>
+                  <a:schemeClr val="tx1"/>
+                </a:solidFill>
+                <a:effectLst/>
+                <a:latin typeface="+mn-lt"/>
+                <a:ea typeface="+mn-ea"/>
+                <a:cs typeface="+mn-cs"/>
+              </a:rPr>
+              <a:t>một</a:t>
+            </a:r>
+            <a:r>
+              <a:rPr lang="en-US" sz="1200" b="0" i="0" kern="1200" dirty="0" smtClean="0">
+                <a:solidFill>
+                  <a:schemeClr val="tx1"/>
+                </a:solidFill>
+                <a:effectLst/>
+                <a:latin typeface="+mn-lt"/>
+                <a:ea typeface="+mn-ea"/>
+                <a:cs typeface="+mn-cs"/>
+              </a:rPr>
+              <a:t> trong </a:t>
+            </a:r>
+            <a:r>
+              <a:rPr lang="en-US" sz="1200" b="0" i="0" kern="1200" dirty="0" err="1" smtClean="0">
+                <a:solidFill>
+                  <a:schemeClr val="tx1"/>
+                </a:solidFill>
+                <a:effectLst/>
+                <a:latin typeface="+mn-lt"/>
+                <a:ea typeface="+mn-ea"/>
+                <a:cs typeface="+mn-cs"/>
+              </a:rPr>
+              <a:t>những</a:t>
+            </a:r>
+            <a:r>
+              <a:rPr lang="en-US" sz="1200" b="0" i="0" kern="1200" dirty="0" smtClean="0">
+                <a:solidFill>
+                  <a:schemeClr val="tx1"/>
+                </a:solidFill>
+                <a:effectLst/>
+                <a:latin typeface="+mn-lt"/>
+                <a:ea typeface="+mn-ea"/>
+                <a:cs typeface="+mn-cs"/>
+              </a:rPr>
+              <a:t> </a:t>
+            </a:r>
+            <a:r>
+              <a:rPr lang="en-US" sz="1200" b="0" i="0" kern="1200" dirty="0" err="1" smtClean="0">
+                <a:solidFill>
+                  <a:schemeClr val="tx1"/>
+                </a:solidFill>
+                <a:effectLst/>
+                <a:latin typeface="+mn-lt"/>
+                <a:ea typeface="+mn-ea"/>
+                <a:cs typeface="+mn-cs"/>
+              </a:rPr>
+              <a:t>Mô</a:t>
+            </a:r>
+            <a:r>
+              <a:rPr lang="en-US" sz="1200" b="0" i="0" kern="1200" dirty="0" smtClean="0">
+                <a:solidFill>
+                  <a:schemeClr val="tx1"/>
+                </a:solidFill>
+                <a:effectLst/>
+                <a:latin typeface="+mn-lt"/>
+                <a:ea typeface="+mn-ea"/>
+                <a:cs typeface="+mn-cs"/>
+              </a:rPr>
+              <a:t> hình </a:t>
+            </a:r>
+            <a:r>
+              <a:rPr lang="en-US" sz="1200" b="0" i="0" kern="1200" dirty="0" err="1" smtClean="0">
+                <a:solidFill>
+                  <a:schemeClr val="tx1"/>
+                </a:solidFill>
+                <a:effectLst/>
+                <a:latin typeface="+mn-lt"/>
+                <a:ea typeface="+mn-ea"/>
+                <a:cs typeface="+mn-cs"/>
+              </a:rPr>
+              <a:t>đầu</a:t>
+            </a:r>
+            <a:r>
+              <a:rPr lang="en-US" sz="1200" b="0" i="0" kern="1200" dirty="0" smtClean="0">
+                <a:solidFill>
+                  <a:schemeClr val="tx1"/>
+                </a:solidFill>
+                <a:effectLst/>
+                <a:latin typeface="+mn-lt"/>
+                <a:ea typeface="+mn-ea"/>
+                <a:cs typeface="+mn-cs"/>
+              </a:rPr>
+              <a:t> </a:t>
+            </a:r>
+            <a:r>
+              <a:rPr lang="en-US" sz="1200" b="0" i="0" kern="1200" dirty="0" err="1" smtClean="0">
+                <a:solidFill>
+                  <a:schemeClr val="tx1"/>
+                </a:solidFill>
+                <a:effectLst/>
+                <a:latin typeface="+mn-lt"/>
+                <a:ea typeface="+mn-ea"/>
+                <a:cs typeface="+mn-cs"/>
+              </a:rPr>
+              <a:t>tiên</a:t>
+            </a:r>
+            <a:r>
+              <a:rPr lang="en-US" sz="1200" b="0" i="0" kern="1200" dirty="0" smtClean="0">
+                <a:solidFill>
+                  <a:schemeClr val="tx1"/>
+                </a:solidFill>
+                <a:effectLst/>
+                <a:latin typeface="+mn-lt"/>
+                <a:ea typeface="+mn-ea"/>
+                <a:cs typeface="+mn-cs"/>
+              </a:rPr>
+              <a:t> </a:t>
+            </a:r>
+            <a:r>
+              <a:rPr lang="en-US" sz="1200" b="0" i="0" kern="1200" dirty="0" err="1" smtClean="0">
+                <a:solidFill>
+                  <a:schemeClr val="tx1"/>
+                </a:solidFill>
+                <a:effectLst/>
+                <a:latin typeface="+mn-lt"/>
+                <a:ea typeface="+mn-ea"/>
+                <a:cs typeface="+mn-cs"/>
+              </a:rPr>
+              <a:t>giải</a:t>
+            </a:r>
+            <a:r>
+              <a:rPr lang="en-US" sz="1200" b="0" i="0" kern="1200" dirty="0" smtClean="0">
+                <a:solidFill>
+                  <a:schemeClr val="tx1"/>
+                </a:solidFill>
+                <a:effectLst/>
+                <a:latin typeface="+mn-lt"/>
+                <a:ea typeface="+mn-ea"/>
+                <a:cs typeface="+mn-cs"/>
+              </a:rPr>
+              <a:t> </a:t>
+            </a:r>
+            <a:r>
+              <a:rPr lang="en-US" sz="1200" b="0" i="0" kern="1200" dirty="0" err="1" smtClean="0">
+                <a:solidFill>
+                  <a:schemeClr val="tx1"/>
+                </a:solidFill>
+                <a:effectLst/>
+                <a:latin typeface="+mn-lt"/>
+                <a:ea typeface="+mn-ea"/>
+                <a:cs typeface="+mn-cs"/>
+              </a:rPr>
+              <a:t>quyết</a:t>
+            </a:r>
+            <a:r>
+              <a:rPr lang="en-US" sz="1200" b="0" i="0" kern="1200" dirty="0" smtClean="0">
+                <a:solidFill>
+                  <a:schemeClr val="tx1"/>
+                </a:solidFill>
+                <a:effectLst/>
+                <a:latin typeface="+mn-lt"/>
+                <a:ea typeface="+mn-ea"/>
+                <a:cs typeface="+mn-cs"/>
+              </a:rPr>
+              <a:t> </a:t>
+            </a:r>
+            <a:r>
+              <a:rPr lang="en-US" sz="1200" b="0" i="0" kern="1200" dirty="0" err="1" smtClean="0">
+                <a:solidFill>
+                  <a:schemeClr val="tx1"/>
+                </a:solidFill>
+                <a:effectLst/>
+                <a:latin typeface="+mn-lt"/>
+                <a:ea typeface="+mn-ea"/>
+                <a:cs typeface="+mn-cs"/>
+              </a:rPr>
+              <a:t>bài</a:t>
+            </a:r>
+            <a:r>
+              <a:rPr lang="en-US" sz="1200" b="0" i="0" kern="1200" dirty="0" smtClean="0">
+                <a:solidFill>
+                  <a:schemeClr val="tx1"/>
+                </a:solidFill>
+                <a:effectLst/>
+                <a:latin typeface="+mn-lt"/>
+                <a:ea typeface="+mn-ea"/>
+                <a:cs typeface="+mn-cs"/>
+              </a:rPr>
+              <a:t> </a:t>
+            </a:r>
+            <a:r>
+              <a:rPr lang="en-US" sz="1200" b="0" i="0" kern="1200" dirty="0" err="1" smtClean="0">
+                <a:solidFill>
+                  <a:schemeClr val="tx1"/>
+                </a:solidFill>
+                <a:effectLst/>
+                <a:latin typeface="+mn-lt"/>
+                <a:ea typeface="+mn-ea"/>
+                <a:cs typeface="+mn-cs"/>
+              </a:rPr>
+              <a:t>toán</a:t>
+            </a:r>
+            <a:r>
+              <a:rPr lang="en-US" sz="1200" b="0" i="0" kern="1200" dirty="0" smtClean="0">
+                <a:solidFill>
+                  <a:schemeClr val="tx1"/>
+                </a:solidFill>
+                <a:effectLst/>
+                <a:latin typeface="+mn-lt"/>
+                <a:ea typeface="+mn-ea"/>
+                <a:cs typeface="+mn-cs"/>
+              </a:rPr>
+              <a:t> </a:t>
+            </a:r>
+            <a:r>
+              <a:rPr lang="en-US" sz="1200" b="0" i="0" kern="1200" dirty="0" err="1" smtClean="0">
+                <a:solidFill>
+                  <a:schemeClr val="tx1"/>
+                </a:solidFill>
+                <a:effectLst/>
+                <a:latin typeface="+mn-lt"/>
+                <a:ea typeface="+mn-ea"/>
+                <a:cs typeface="+mn-cs"/>
+              </a:rPr>
+              <a:t>phân</a:t>
+            </a:r>
+            <a:r>
+              <a:rPr lang="en-US" sz="1200" b="0" i="0" kern="1200" dirty="0" smtClean="0">
+                <a:solidFill>
+                  <a:schemeClr val="tx1"/>
+                </a:solidFill>
+                <a:effectLst/>
+                <a:latin typeface="+mn-lt"/>
+                <a:ea typeface="+mn-ea"/>
+                <a:cs typeface="+mn-cs"/>
+              </a:rPr>
+              <a:t> </a:t>
+            </a:r>
+            <a:r>
+              <a:rPr lang="en-US" sz="1200" b="0" i="0" kern="1200" dirty="0" err="1" smtClean="0">
+                <a:solidFill>
+                  <a:schemeClr val="tx1"/>
+                </a:solidFill>
+                <a:effectLst/>
+                <a:latin typeface="+mn-lt"/>
+                <a:ea typeface="+mn-ea"/>
+                <a:cs typeface="+mn-cs"/>
+              </a:rPr>
+              <a:t>lớp</a:t>
+            </a:r>
+            <a:r>
+              <a:rPr lang="en-US" sz="1200" b="0" i="0" kern="1200" dirty="0" smtClean="0">
+                <a:solidFill>
+                  <a:schemeClr val="tx1"/>
+                </a:solidFill>
+                <a:effectLst/>
+                <a:latin typeface="+mn-lt"/>
+                <a:ea typeface="+mn-ea"/>
+                <a:cs typeface="+mn-cs"/>
+              </a:rPr>
+              <a:t> (classification)</a:t>
+            </a:r>
+            <a:r>
+              <a:rPr lang="en-US" sz="1200" b="0" i="0" kern="1200" dirty="0" err="1" smtClean="0">
+                <a:solidFill>
+                  <a:schemeClr val="tx1"/>
+                </a:solidFill>
+                <a:effectLst/>
+                <a:latin typeface="+mn-lt"/>
+                <a:ea typeface="+mn-ea"/>
+                <a:cs typeface="+mn-cs"/>
+              </a:rPr>
+              <a:t>một</a:t>
+            </a:r>
+            <a:r>
+              <a:rPr lang="en-US" sz="1200" b="0" i="0" kern="1200" dirty="0" smtClean="0">
+                <a:solidFill>
+                  <a:schemeClr val="tx1"/>
+                </a:solidFill>
+                <a:effectLst/>
+                <a:latin typeface="+mn-lt"/>
+                <a:ea typeface="+mn-ea"/>
+                <a:cs typeface="+mn-cs"/>
+              </a:rPr>
+              <a:t> </a:t>
+            </a:r>
+            <a:r>
+              <a:rPr lang="en-US" sz="1200" b="0" i="0" kern="1200" dirty="0" err="1" smtClean="0">
+                <a:solidFill>
+                  <a:schemeClr val="tx1"/>
+                </a:solidFill>
+                <a:effectLst/>
+                <a:latin typeface="+mn-lt"/>
+                <a:ea typeface="+mn-ea"/>
+                <a:cs typeface="+mn-cs"/>
+              </a:rPr>
+              <a:t>bức</a:t>
+            </a:r>
+            <a:r>
+              <a:rPr lang="en-US" sz="1200" b="0" i="0" kern="1200" dirty="0" smtClean="0">
+                <a:solidFill>
+                  <a:schemeClr val="tx1"/>
+                </a:solidFill>
+                <a:effectLst/>
+                <a:latin typeface="+mn-lt"/>
+                <a:ea typeface="+mn-ea"/>
+                <a:cs typeface="+mn-cs"/>
+              </a:rPr>
+              <a:t> </a:t>
+            </a:r>
+            <a:r>
+              <a:rPr lang="en-US" sz="1200" b="0" i="0" kern="1200" dirty="0" err="1" smtClean="0">
+                <a:solidFill>
+                  <a:schemeClr val="tx1"/>
+                </a:solidFill>
+                <a:effectLst/>
+                <a:latin typeface="+mn-lt"/>
+                <a:ea typeface="+mn-ea"/>
+                <a:cs typeface="+mn-cs"/>
+              </a:rPr>
+              <a:t>ảnh</a:t>
+            </a:r>
+            <a:r>
+              <a:rPr lang="en-US" sz="1200" b="0" i="0" kern="1200" dirty="0" smtClean="0">
+                <a:solidFill>
+                  <a:schemeClr val="tx1"/>
+                </a:solidFill>
+                <a:effectLst/>
+                <a:latin typeface="+mn-lt"/>
+                <a:ea typeface="+mn-ea"/>
+                <a:cs typeface="+mn-cs"/>
+              </a:rPr>
+              <a:t> </a:t>
+            </a:r>
+            <a:r>
+              <a:rPr lang="en-US" sz="1200" b="0" i="0" kern="1200" dirty="0" err="1" smtClean="0">
+                <a:solidFill>
+                  <a:schemeClr val="tx1"/>
+                </a:solidFill>
+                <a:effectLst/>
+                <a:latin typeface="+mn-lt"/>
+                <a:ea typeface="+mn-ea"/>
+                <a:cs typeface="+mn-cs"/>
+              </a:rPr>
+              <a:t>vào</a:t>
+            </a:r>
+            <a:r>
+              <a:rPr lang="en-US" sz="1200" b="0" i="0" kern="1200" dirty="0" smtClean="0">
+                <a:solidFill>
+                  <a:schemeClr val="tx1"/>
+                </a:solidFill>
+                <a:effectLst/>
+                <a:latin typeface="+mn-lt"/>
+                <a:ea typeface="+mn-ea"/>
+                <a:cs typeface="+mn-cs"/>
+              </a:rPr>
+              <a:t> 1 </a:t>
+            </a:r>
+            <a:r>
+              <a:rPr lang="en-US" sz="1200" b="0" i="0" kern="1200" dirty="0" err="1" smtClean="0">
+                <a:solidFill>
+                  <a:schemeClr val="tx1"/>
+                </a:solidFill>
+                <a:effectLst/>
+                <a:latin typeface="+mn-lt"/>
+                <a:ea typeface="+mn-ea"/>
+                <a:cs typeface="+mn-cs"/>
+              </a:rPr>
+              <a:t>lớp</a:t>
+            </a:r>
+            <a:r>
+              <a:rPr lang="en-US" sz="1200" b="0" i="0" kern="1200" dirty="0" smtClean="0">
+                <a:solidFill>
+                  <a:schemeClr val="tx1"/>
+                </a:solidFill>
+                <a:effectLst/>
+                <a:latin typeface="+mn-lt"/>
+                <a:ea typeface="+mn-ea"/>
+                <a:cs typeface="+mn-cs"/>
+              </a:rPr>
+              <a:t> trong 1000 </a:t>
+            </a:r>
+            <a:r>
+              <a:rPr lang="en-US" sz="1200" b="0" i="0" kern="1200" dirty="0" err="1" smtClean="0">
+                <a:solidFill>
+                  <a:schemeClr val="tx1"/>
+                </a:solidFill>
+                <a:effectLst/>
+                <a:latin typeface="+mn-lt"/>
+                <a:ea typeface="+mn-ea"/>
+                <a:cs typeface="+mn-cs"/>
+              </a:rPr>
+              <a:t>lớp</a:t>
+            </a:r>
+            <a:r>
+              <a:rPr lang="en-US" sz="1200" b="0" i="0" kern="1200" dirty="0" smtClean="0">
+                <a:solidFill>
+                  <a:schemeClr val="tx1"/>
+                </a:solidFill>
+                <a:effectLst/>
+                <a:latin typeface="+mn-lt"/>
+                <a:ea typeface="+mn-ea"/>
+                <a:cs typeface="+mn-cs"/>
+              </a:rPr>
+              <a:t> khác nhau (</a:t>
+            </a:r>
+            <a:r>
+              <a:rPr lang="en-US" sz="1200" b="0" i="0" kern="1200" dirty="0" err="1" smtClean="0">
+                <a:solidFill>
+                  <a:schemeClr val="tx1"/>
+                </a:solidFill>
+                <a:effectLst/>
+                <a:latin typeface="+mn-lt"/>
+                <a:ea typeface="+mn-ea"/>
+                <a:cs typeface="+mn-cs"/>
+              </a:rPr>
+              <a:t>vd</a:t>
+            </a:r>
+            <a:r>
+              <a:rPr lang="en-US" sz="1200" b="0" i="0" kern="1200" dirty="0" smtClean="0">
+                <a:solidFill>
+                  <a:schemeClr val="tx1"/>
+                </a:solidFill>
+                <a:effectLst/>
+                <a:latin typeface="+mn-lt"/>
+                <a:ea typeface="+mn-ea"/>
+                <a:cs typeface="+mn-cs"/>
+              </a:rPr>
+              <a:t> </a:t>
+            </a:r>
+            <a:r>
+              <a:rPr lang="en-US" sz="1200" b="0" i="0" kern="1200" dirty="0" err="1" smtClean="0">
+                <a:solidFill>
+                  <a:schemeClr val="tx1"/>
+                </a:solidFill>
+                <a:effectLst/>
+                <a:latin typeface="+mn-lt"/>
+                <a:ea typeface="+mn-ea"/>
+                <a:cs typeface="+mn-cs"/>
+              </a:rPr>
+              <a:t>gà</a:t>
+            </a:r>
+            <a:r>
+              <a:rPr lang="en-US" sz="1200" b="0" i="0" kern="1200" dirty="0" smtClean="0">
+                <a:solidFill>
+                  <a:schemeClr val="tx1"/>
+                </a:solidFill>
+                <a:effectLst/>
+                <a:latin typeface="+mn-lt"/>
+                <a:ea typeface="+mn-ea"/>
+                <a:cs typeface="+mn-cs"/>
+              </a:rPr>
+              <a:t>, </a:t>
+            </a:r>
+            <a:r>
+              <a:rPr lang="en-US" sz="1200" b="0" i="0" kern="1200" dirty="0" err="1" smtClean="0">
+                <a:solidFill>
+                  <a:schemeClr val="tx1"/>
+                </a:solidFill>
+                <a:effectLst/>
+                <a:latin typeface="+mn-lt"/>
+                <a:ea typeface="+mn-ea"/>
+                <a:cs typeface="+mn-cs"/>
+              </a:rPr>
+              <a:t>chó</a:t>
+            </a:r>
+            <a:r>
+              <a:rPr lang="en-US" sz="1200" b="0" i="0" kern="1200" dirty="0" smtClean="0">
+                <a:solidFill>
+                  <a:schemeClr val="tx1"/>
+                </a:solidFill>
+                <a:effectLst/>
+                <a:latin typeface="+mn-lt"/>
+                <a:ea typeface="+mn-ea"/>
+                <a:cs typeface="+mn-cs"/>
+              </a:rPr>
+              <a:t>, </a:t>
+            </a:r>
+            <a:r>
+              <a:rPr lang="en-US" sz="1200" b="0" i="0" kern="1200" dirty="0" err="1" smtClean="0">
+                <a:solidFill>
+                  <a:schemeClr val="tx1"/>
+                </a:solidFill>
+                <a:effectLst/>
+                <a:latin typeface="+mn-lt"/>
+                <a:ea typeface="+mn-ea"/>
+                <a:cs typeface="+mn-cs"/>
+              </a:rPr>
+              <a:t>mèo</a:t>
+            </a:r>
+            <a:r>
+              <a:rPr lang="en-US" sz="1200" b="0" i="0" kern="1200" dirty="0" smtClean="0">
+                <a:solidFill>
+                  <a:schemeClr val="tx1"/>
+                </a:solidFill>
+                <a:effectLst/>
+                <a:latin typeface="+mn-lt"/>
+                <a:ea typeface="+mn-ea"/>
+                <a:cs typeface="+mn-cs"/>
+              </a:rPr>
+              <a:t> … ). </a:t>
+            </a:r>
+            <a:r>
+              <a:rPr lang="en-US" sz="1200" b="0" i="0" kern="1200" dirty="0" err="1" smtClean="0">
+                <a:solidFill>
+                  <a:schemeClr val="tx1"/>
+                </a:solidFill>
+                <a:effectLst/>
+                <a:latin typeface="+mn-lt"/>
+                <a:ea typeface="+mn-ea"/>
+                <a:cs typeface="+mn-cs"/>
+              </a:rPr>
+              <a:t>Đầu</a:t>
+            </a:r>
+            <a:r>
+              <a:rPr lang="en-US" sz="1200" b="0" i="0" kern="1200" dirty="0" smtClean="0">
+                <a:solidFill>
+                  <a:schemeClr val="tx1"/>
+                </a:solidFill>
+                <a:effectLst/>
+                <a:latin typeface="+mn-lt"/>
+                <a:ea typeface="+mn-ea"/>
+                <a:cs typeface="+mn-cs"/>
+              </a:rPr>
+              <a:t> ra của </a:t>
+            </a:r>
+            <a:r>
+              <a:rPr lang="en-US" sz="1200" b="0" i="0" kern="1200" dirty="0" err="1" smtClean="0">
+                <a:solidFill>
+                  <a:schemeClr val="tx1"/>
+                </a:solidFill>
+                <a:effectLst/>
+                <a:latin typeface="+mn-lt"/>
+                <a:ea typeface="+mn-ea"/>
+                <a:cs typeface="+mn-cs"/>
+              </a:rPr>
+              <a:t>mô</a:t>
+            </a:r>
+            <a:r>
+              <a:rPr lang="en-US" sz="1200" b="0" i="0" kern="1200" dirty="0" smtClean="0">
+                <a:solidFill>
+                  <a:schemeClr val="tx1"/>
+                </a:solidFill>
+                <a:effectLst/>
+                <a:latin typeface="+mn-lt"/>
+                <a:ea typeface="+mn-ea"/>
+                <a:cs typeface="+mn-cs"/>
+              </a:rPr>
+              <a:t> hình là </a:t>
+            </a:r>
+            <a:r>
+              <a:rPr lang="en-US" sz="1200" b="0" i="0" kern="1200" dirty="0" err="1" smtClean="0">
+                <a:solidFill>
+                  <a:schemeClr val="tx1"/>
+                </a:solidFill>
+                <a:effectLst/>
+                <a:latin typeface="+mn-lt"/>
+                <a:ea typeface="+mn-ea"/>
+                <a:cs typeface="+mn-cs"/>
+              </a:rPr>
+              <a:t>một</a:t>
+            </a:r>
+            <a:r>
+              <a:rPr lang="en-US" sz="1200" b="0" i="0" kern="1200" dirty="0" smtClean="0">
+                <a:solidFill>
+                  <a:schemeClr val="tx1"/>
+                </a:solidFill>
+                <a:effectLst/>
+                <a:latin typeface="+mn-lt"/>
+                <a:ea typeface="+mn-ea"/>
+                <a:cs typeface="+mn-cs"/>
+              </a:rPr>
+              <a:t> vector có 1000 </a:t>
+            </a:r>
+            <a:r>
+              <a:rPr lang="en-US" sz="1200" b="0" i="0" kern="1200" dirty="0" err="1" smtClean="0">
+                <a:solidFill>
+                  <a:schemeClr val="tx1"/>
+                </a:solidFill>
+                <a:effectLst/>
+                <a:latin typeface="+mn-lt"/>
+                <a:ea typeface="+mn-ea"/>
+                <a:cs typeface="+mn-cs"/>
+              </a:rPr>
+              <a:t>phần</a:t>
+            </a:r>
+            <a:r>
+              <a:rPr lang="en-US" sz="1200" b="0" i="0" kern="1200" dirty="0" smtClean="0">
+                <a:solidFill>
+                  <a:schemeClr val="tx1"/>
+                </a:solidFill>
+                <a:effectLst/>
+                <a:latin typeface="+mn-lt"/>
+                <a:ea typeface="+mn-ea"/>
+                <a:cs typeface="+mn-cs"/>
+              </a:rPr>
+              <a:t> </a:t>
+            </a:r>
+            <a:r>
+              <a:rPr lang="en-US" sz="1200" b="0" i="0" kern="1200" dirty="0" err="1" smtClean="0">
+                <a:solidFill>
+                  <a:schemeClr val="tx1"/>
+                </a:solidFill>
+                <a:effectLst/>
+                <a:latin typeface="+mn-lt"/>
+                <a:ea typeface="+mn-ea"/>
+                <a:cs typeface="+mn-cs"/>
+              </a:rPr>
+              <a:t>tử</a:t>
+            </a:r>
+            <a:r>
+              <a:rPr lang="en-US" sz="1200" b="0" i="0" kern="1200" dirty="0" smtClean="0">
+                <a:solidFill>
+                  <a:schemeClr val="tx1"/>
+                </a:solidFill>
+                <a:effectLst/>
+                <a:latin typeface="+mn-lt"/>
+                <a:ea typeface="+mn-ea"/>
+                <a:cs typeface="+mn-cs"/>
+              </a:rPr>
+              <a:t>.</a:t>
+            </a:r>
+            <a:r>
+              <a:rPr lang="en-US" dirty="0" smtClean="0"/>
+              <a:t/>
+            </a:r>
+            <a:br>
+              <a:rPr lang="en-US" dirty="0" smtClean="0"/>
+            </a:br>
+            <a:r>
+              <a:rPr lang="en-US" sz="1200" b="0" i="0" kern="1200" dirty="0" err="1" smtClean="0">
+                <a:solidFill>
+                  <a:schemeClr val="tx1"/>
+                </a:solidFill>
+                <a:effectLst/>
+                <a:latin typeface="+mn-lt"/>
+                <a:ea typeface="+mn-ea"/>
+                <a:cs typeface="+mn-cs"/>
+              </a:rPr>
+              <a:t>Mạng</a:t>
+            </a:r>
+            <a:r>
+              <a:rPr lang="en-US" sz="1200" b="0" i="0" kern="1200" dirty="0" smtClean="0">
+                <a:solidFill>
+                  <a:schemeClr val="tx1"/>
+                </a:solidFill>
+                <a:effectLst/>
+                <a:latin typeface="+mn-lt"/>
+                <a:ea typeface="+mn-ea"/>
+                <a:cs typeface="+mn-cs"/>
+              </a:rPr>
+              <a:t> CNN này đã </a:t>
+            </a:r>
+            <a:r>
+              <a:rPr lang="en-US" sz="1200" b="0" i="0" kern="1200" dirty="0" err="1" smtClean="0">
+                <a:solidFill>
+                  <a:schemeClr val="tx1"/>
+                </a:solidFill>
+                <a:effectLst/>
+                <a:latin typeface="+mn-lt"/>
+                <a:ea typeface="+mn-ea"/>
+                <a:cs typeface="+mn-cs"/>
+              </a:rPr>
+              <a:t>thắng</a:t>
+            </a:r>
+            <a:r>
+              <a:rPr lang="en-US" sz="1200" b="0" i="0" kern="1200" dirty="0" smtClean="0">
+                <a:solidFill>
+                  <a:schemeClr val="tx1"/>
+                </a:solidFill>
+                <a:effectLst/>
+                <a:latin typeface="+mn-lt"/>
+                <a:ea typeface="+mn-ea"/>
+                <a:cs typeface="+mn-cs"/>
+              </a:rPr>
+              <a:t> </a:t>
+            </a:r>
+            <a:r>
+              <a:rPr lang="en-US" sz="1200" b="0" i="0" kern="1200" dirty="0" err="1" smtClean="0">
+                <a:solidFill>
+                  <a:schemeClr val="tx1"/>
+                </a:solidFill>
+                <a:effectLst/>
+                <a:latin typeface="+mn-lt"/>
+                <a:ea typeface="+mn-ea"/>
+                <a:cs typeface="+mn-cs"/>
+              </a:rPr>
+              <a:t>hạng</a:t>
+            </a:r>
+            <a:r>
+              <a:rPr lang="en-US" sz="1200" b="0" i="0" kern="1200" dirty="0" smtClean="0">
+                <a:solidFill>
+                  <a:schemeClr val="tx1"/>
+                </a:solidFill>
+                <a:effectLst/>
+                <a:latin typeface="+mn-lt"/>
+                <a:ea typeface="+mn-ea"/>
+                <a:cs typeface="+mn-cs"/>
+              </a:rPr>
+              <a:t> </a:t>
+            </a:r>
+            <a:r>
+              <a:rPr lang="en-US" sz="1200" b="0" i="0" kern="1200" dirty="0" err="1" smtClean="0">
+                <a:solidFill>
+                  <a:schemeClr val="tx1"/>
+                </a:solidFill>
+                <a:effectLst/>
+                <a:latin typeface="+mn-lt"/>
+                <a:ea typeface="+mn-ea"/>
+                <a:cs typeface="+mn-cs"/>
+              </a:rPr>
+              <a:t>nhất</a:t>
+            </a:r>
+            <a:r>
+              <a:rPr lang="en-US" sz="1200" b="0" i="0" kern="1200" dirty="0" smtClean="0">
+                <a:solidFill>
+                  <a:schemeClr val="tx1"/>
+                </a:solidFill>
+                <a:effectLst/>
+                <a:latin typeface="+mn-lt"/>
+                <a:ea typeface="+mn-ea"/>
+                <a:cs typeface="+mn-cs"/>
+              </a:rPr>
+              <a:t> trong </a:t>
+            </a:r>
+            <a:r>
+              <a:rPr lang="en-US" sz="1200" b="0" i="0" kern="1200" dirty="0" err="1" smtClean="0">
+                <a:solidFill>
+                  <a:schemeClr val="tx1"/>
+                </a:solidFill>
+                <a:effectLst/>
+                <a:latin typeface="+mn-lt"/>
+                <a:ea typeface="+mn-ea"/>
+                <a:cs typeface="+mn-cs"/>
+              </a:rPr>
+              <a:t>cuộc</a:t>
+            </a:r>
+            <a:r>
+              <a:rPr lang="en-US" sz="1200" b="0" i="0" kern="1200" dirty="0" smtClean="0">
+                <a:solidFill>
+                  <a:schemeClr val="tx1"/>
+                </a:solidFill>
+                <a:effectLst/>
+                <a:latin typeface="+mn-lt"/>
+                <a:ea typeface="+mn-ea"/>
+                <a:cs typeface="+mn-cs"/>
+              </a:rPr>
+              <a:t> </a:t>
+            </a:r>
+            <a:r>
+              <a:rPr lang="en-US" sz="1200" b="0" i="0" kern="1200" dirty="0" err="1" smtClean="0">
+                <a:solidFill>
+                  <a:schemeClr val="tx1"/>
+                </a:solidFill>
+                <a:effectLst/>
+                <a:latin typeface="+mn-lt"/>
+                <a:ea typeface="+mn-ea"/>
+                <a:cs typeface="+mn-cs"/>
+              </a:rPr>
+              <a:t>thi</a:t>
+            </a:r>
+            <a:r>
+              <a:rPr lang="en-US" sz="1200" b="0" i="0" kern="1200" dirty="0" smtClean="0">
+                <a:solidFill>
+                  <a:schemeClr val="tx1"/>
+                </a:solidFill>
+                <a:effectLst/>
+                <a:latin typeface="+mn-lt"/>
+                <a:ea typeface="+mn-ea"/>
+                <a:cs typeface="+mn-cs"/>
+              </a:rPr>
+              <a:t> ILSVRC </a:t>
+            </a:r>
+            <a:r>
+              <a:rPr lang="en-US" sz="1200" b="0" i="0" kern="1200" dirty="0" err="1" smtClean="0">
+                <a:solidFill>
+                  <a:schemeClr val="tx1"/>
+                </a:solidFill>
+                <a:effectLst/>
+                <a:latin typeface="+mn-lt"/>
+                <a:ea typeface="+mn-ea"/>
+                <a:cs typeface="+mn-cs"/>
+              </a:rPr>
+              <a:t>năm</a:t>
+            </a:r>
+            <a:r>
+              <a:rPr lang="en-US" sz="1200" b="0" i="0" kern="1200" dirty="0" smtClean="0">
+                <a:solidFill>
+                  <a:schemeClr val="tx1"/>
+                </a:solidFill>
+                <a:effectLst/>
+                <a:latin typeface="+mn-lt"/>
+                <a:ea typeface="+mn-ea"/>
+                <a:cs typeface="+mn-cs"/>
+              </a:rPr>
+              <a:t> 201</a:t>
+            </a:r>
+          </a:p>
+          <a:p>
+            <a:endParaRPr lang="en-US" sz="1200" b="0" i="0" kern="1200" dirty="0" smtClean="0">
+              <a:solidFill>
+                <a:schemeClr val="tx1"/>
+              </a:solidFill>
+              <a:effectLst/>
+              <a:latin typeface="+mn-lt"/>
+              <a:ea typeface="+mn-ea"/>
+              <a:cs typeface="+mn-cs"/>
+            </a:endParaRPr>
+          </a:p>
+          <a:p>
+            <a:r>
+              <a:rPr lang="vi-VN" sz="1200" b="0" i="0" kern="1200" dirty="0" smtClean="0">
+                <a:solidFill>
+                  <a:schemeClr val="tx1"/>
+                </a:solidFill>
+                <a:effectLst/>
+                <a:latin typeface="+mn-lt"/>
+                <a:ea typeface="+mn-ea"/>
+                <a:cs typeface="+mn-cs"/>
+              </a:rPr>
+              <a:t>Đầu vào của AlexNet là một bức ảnh RGB 3x256x256 ở cả tập train và tập test. Đây là kích thước chuẩn bắt buộc sử dụng trong mạng.</a:t>
+            </a:r>
+          </a:p>
+          <a:p>
+            <a:r>
+              <a:rPr lang="vi-VN" sz="1200" b="0" i="0" kern="1200" dirty="0" smtClean="0">
+                <a:solidFill>
+                  <a:schemeClr val="tx1"/>
+                </a:solidFill>
+                <a:effectLst/>
+                <a:latin typeface="+mn-lt"/>
+                <a:ea typeface="+mn-ea"/>
+                <a:cs typeface="+mn-cs"/>
+              </a:rPr>
+              <a:t>Sau khi chuẩn hóa, kích thước đầu vào được sử dụng là 227x227 và cắt ngẫu nhiên trên hình gốc 256x256.</a:t>
+            </a:r>
+          </a:p>
+          <a:p>
+            <a:r>
+              <a:rPr lang="vi-VN" sz="1200" b="0" i="0" kern="1200" dirty="0" smtClean="0">
+                <a:solidFill>
+                  <a:schemeClr val="tx1"/>
+                </a:solidFill>
+                <a:effectLst/>
+                <a:latin typeface="+mn-lt"/>
+                <a:ea typeface="+mn-ea"/>
+                <a:cs typeface="+mn-cs"/>
+              </a:rPr>
+              <a:t>Kiến trúc AlexNet bao gồm 5 convolutional Layer và 3 fully connected layer. Nó có tổng cộng 60 triệu tham số và 650 nghìn neural.</a:t>
+            </a:r>
+          </a:p>
+          <a:p>
+            <a:r>
+              <a:rPr lang="vi-VN" sz="1200" b="0" i="0" kern="1200" dirty="0" smtClean="0">
+                <a:solidFill>
+                  <a:schemeClr val="tx1"/>
+                </a:solidFill>
+                <a:effectLst/>
+                <a:latin typeface="+mn-lt"/>
+                <a:ea typeface="+mn-ea"/>
+                <a:cs typeface="+mn-cs"/>
+              </a:rPr>
+              <a:t>Các convolutional Layer (filter) đầu tiên có chức năng trích xuất các đặc trưng cơ bản của tấm ảnh:</a:t>
+            </a:r>
+          </a:p>
+          <a:p>
+            <a:pPr lvl="1"/>
+            <a:r>
+              <a:rPr lang="vi-VN" sz="1200" b="0" i="0" kern="1200" dirty="0" smtClean="0">
+                <a:solidFill>
+                  <a:schemeClr val="tx1"/>
+                </a:solidFill>
+                <a:effectLst/>
+                <a:latin typeface="+mn-lt"/>
+                <a:ea typeface="+mn-ea"/>
+                <a:cs typeface="+mn-cs"/>
+              </a:rPr>
+              <a:t>Filter đầu tiên chứa 96 kernel có kích thước 3x11x11, stride=4</a:t>
+            </a:r>
+          </a:p>
+          <a:p>
+            <a:pPr lvl="1"/>
+            <a:r>
+              <a:rPr lang="vi-VN" sz="1200" b="0" i="0" kern="1200" dirty="0" smtClean="0">
+                <a:solidFill>
+                  <a:schemeClr val="tx1"/>
+                </a:solidFill>
+                <a:effectLst/>
+                <a:latin typeface="+mn-lt"/>
+                <a:ea typeface="+mn-ea"/>
+                <a:cs typeface="+mn-cs"/>
+              </a:rPr>
+              <a:t>Các layer sau kết nối với layer trước đó qua một Overlapping Max Pooling ở layer thứ 1,2 và 5. Max Pooling layer thường được sử dụng để giảm chiều rộng và chiều dài của một tensor nhưng vẫn giữ nguyên chiều sâu</a:t>
+            </a:r>
+          </a:p>
+          <a:p>
+            <a:pPr lvl="1"/>
+            <a:r>
+              <a:rPr lang="vi-VN" sz="1200" b="0" i="0" kern="1200" dirty="0" smtClean="0">
+                <a:solidFill>
+                  <a:schemeClr val="tx1"/>
+                </a:solidFill>
+                <a:effectLst/>
+                <a:latin typeface="+mn-lt"/>
+                <a:ea typeface="+mn-ea"/>
+                <a:cs typeface="+mn-cs"/>
+              </a:rPr>
+              <a:t>ReLU nonlinerity được sử dụng sau tất các các convolution và fully connected layer. Theo tác giả, ReLU giúp cho mạng</a:t>
+            </a:r>
+            <a:br>
+              <a:rPr lang="vi-VN" sz="1200" b="0" i="0" kern="1200" dirty="0" smtClean="0">
+                <a:solidFill>
+                  <a:schemeClr val="tx1"/>
+                </a:solidFill>
+                <a:effectLst/>
+                <a:latin typeface="+mn-lt"/>
+                <a:ea typeface="+mn-ea"/>
+                <a:cs typeface="+mn-cs"/>
+              </a:rPr>
+            </a:br>
+            <a:r>
+              <a:rPr lang="vi-VN" sz="1200" b="0" i="0" kern="1200" dirty="0" smtClean="0">
+                <a:solidFill>
+                  <a:schemeClr val="tx1"/>
+                </a:solidFill>
+                <a:effectLst/>
+                <a:latin typeface="+mn-lt"/>
+                <a:ea typeface="+mn-ea"/>
+                <a:cs typeface="+mn-cs"/>
+              </a:rPr>
+              <a:t>huấn luyện nhanh hơn và cải thiện độ lỗi gấp nhiều lần so với khi dùng hàm Tanh hay Sigmoid.</a:t>
+            </a:r>
+          </a:p>
+          <a:p>
+            <a:pPr lvl="1"/>
+            <a:r>
+              <a:rPr lang="vi-VN" sz="1200" b="0" i="0" kern="1200" dirty="0" smtClean="0">
+                <a:solidFill>
+                  <a:schemeClr val="tx1"/>
+                </a:solidFill>
+                <a:effectLst/>
+                <a:latin typeface="+mn-lt"/>
+                <a:ea typeface="+mn-ea"/>
+                <a:cs typeface="+mn-cs"/>
+              </a:rPr>
+              <a:t>Cho đến cuối cùng, layer thứ 7 là fully connected kết nối với layer 8 là một bộ phân lớp softmax với 1000 vector đầu ra, với tổng giá trị bằng 1.</a:t>
+            </a:r>
+          </a:p>
+          <a:p>
             <a:endParaRPr lang="en-US" dirty="0"/>
           </a:p>
         </p:txBody>
@@ -14395,7 +15443,7 @@
     </p:spTree>
     <p:extLst>
       <p:ext uri="{BB962C8B-B14F-4D97-AF65-F5344CB8AC3E}">
-        <p14:creationId xmlns:p14="http://schemas.microsoft.com/office/powerpoint/2010/main" val="4014226882"/>
+        <p14:creationId xmlns:p14="http://schemas.microsoft.com/office/powerpoint/2010/main" val="1051618810"/>
       </p:ext>
     </p:extLst>
   </p:cSld>
@@ -14449,6 +15497,101 @@
           <a:bodyPr/>
           <a:lstStyle/>
           <a:p>
+            <a:r>
+              <a:rPr lang="vi-VN" sz="1200" b="0" i="0" kern="1200" dirty="0" smtClean="0">
+                <a:solidFill>
+                  <a:schemeClr val="tx1"/>
+                </a:solidFill>
+                <a:effectLst/>
+                <a:latin typeface="+mn-lt"/>
+                <a:ea typeface="+mn-ea"/>
+                <a:cs typeface="+mn-cs"/>
+              </a:rPr>
+              <a:t>Mô hình mới lấy ý tưởng từ cả mô hình OverFeat và Vehicle Detection như đã trình bày ở phần trên cho bài toán Traffic Sign Detection</a:t>
+            </a:r>
+          </a:p>
+          <a:p>
+            <a:r>
+              <a:rPr lang="vi-VN" dirty="0" smtClean="0"/>
+              <a:t/>
+            </a:r>
+            <a:br>
+              <a:rPr lang="vi-VN" dirty="0" smtClean="0"/>
+            </a:br>
+            <a:r>
+              <a:rPr lang="vi-VN" sz="1200" b="0" i="0" kern="1200" dirty="0" smtClean="0">
+                <a:solidFill>
+                  <a:schemeClr val="tx1"/>
+                </a:solidFill>
+                <a:effectLst/>
+                <a:latin typeface="+mn-lt"/>
+                <a:ea typeface="+mn-ea"/>
+                <a:cs typeface="+mn-cs"/>
+              </a:rPr>
+              <a:t>Các thay đổi, điều chỉnh so với mô hình gốc như sau:</a:t>
+            </a:r>
+          </a:p>
+          <a:p>
+            <a:pPr lvl="1"/>
+            <a:r>
+              <a:rPr lang="vi-VN" sz="1200" b="0" i="0" kern="1200" dirty="0" smtClean="0">
+                <a:solidFill>
+                  <a:schemeClr val="tx1"/>
+                </a:solidFill>
+                <a:effectLst/>
+                <a:latin typeface="+mn-lt"/>
+                <a:ea typeface="+mn-ea"/>
+                <a:cs typeface="+mn-cs"/>
+              </a:rPr>
+              <a:t>Các tác giả đã thử nghiệm việc chạy song song truoc khi xong layer thu 7, và nhận thấy tách nhánh để chạy song song từ sau layer 6 là giải pháp cân bằng giữa</a:t>
+            </a:r>
+            <a:br>
+              <a:rPr lang="vi-VN" sz="1200" b="0" i="0" kern="1200" dirty="0" smtClean="0">
+                <a:solidFill>
+                  <a:schemeClr val="tx1"/>
+                </a:solidFill>
+                <a:effectLst/>
+                <a:latin typeface="+mn-lt"/>
+                <a:ea typeface="+mn-ea"/>
+                <a:cs typeface="+mn-cs"/>
+              </a:rPr>
+            </a:br>
+            <a:r>
+              <a:rPr lang="vi-VN" sz="1200" b="0" i="0" kern="1200" dirty="0" smtClean="0">
+                <a:solidFill>
+                  <a:schemeClr val="tx1"/>
+                </a:solidFill>
+                <a:effectLst/>
+                <a:latin typeface="+mn-lt"/>
+                <a:ea typeface="+mn-ea"/>
+                <a:cs typeface="+mn-cs"/>
+              </a:rPr>
+              <a:t>thời gian tính toán và độ chính xác cần thiết (tách càng sớm thì performance càng nhanh nhưng tốn nhiều tài nguyên, tách quá trễ sẽ tính toán lâu hơn)</a:t>
+            </a:r>
+          </a:p>
+          <a:p>
+            <a:pPr lvl="1"/>
+            <a:r>
+              <a:rPr lang="vi-VN" sz="1200" b="0" i="0" kern="1200" dirty="0" smtClean="0">
+                <a:solidFill>
+                  <a:schemeClr val="tx1"/>
+                </a:solidFill>
+                <a:effectLst/>
+                <a:latin typeface="+mn-lt"/>
+                <a:ea typeface="+mn-ea"/>
+                <a:cs typeface="+mn-cs"/>
+              </a:rPr>
+              <a:t>So với bài toán Vehicle Detection, thì layer cuối cùng có thêm 1 nhánh chạy song song giúp phân loại luôn loại biển báo.</a:t>
+            </a:r>
+          </a:p>
+          <a:p>
+            <a:r>
+              <a:rPr lang="vi-VN" dirty="0" smtClean="0"/>
+              <a:t/>
+            </a:r>
+            <a:br>
+              <a:rPr lang="vi-VN" dirty="0" smtClean="0"/>
+            </a:br>
             <a:endParaRPr lang="en-US" dirty="0"/>
           </a:p>
         </p:txBody>
@@ -14479,7 +15622,7 @@
     </p:spTree>
     <p:extLst>
       <p:ext uri="{BB962C8B-B14F-4D97-AF65-F5344CB8AC3E}">
-        <p14:creationId xmlns:p14="http://schemas.microsoft.com/office/powerpoint/2010/main" val="2482357578"/>
+        <p14:creationId xmlns:p14="http://schemas.microsoft.com/office/powerpoint/2010/main" val="3416246478"/>
       </p:ext>
     </p:extLst>
   </p:cSld>
@@ -14563,7 +15706,7 @@
     </p:spTree>
     <p:extLst>
       <p:ext uri="{BB962C8B-B14F-4D97-AF65-F5344CB8AC3E}">
-        <p14:creationId xmlns:p14="http://schemas.microsoft.com/office/powerpoint/2010/main" val="1380319070"/>
+        <p14:creationId xmlns:p14="http://schemas.microsoft.com/office/powerpoint/2010/main" val="2482357578"/>
       </p:ext>
     </p:extLst>
   </p:cSld>
@@ -14647,6 +15790,90 @@
     </p:spTree>
     <p:extLst>
       <p:ext uri="{BB962C8B-B14F-4D97-AF65-F5344CB8AC3E}">
+        <p14:creationId xmlns:p14="http://schemas.microsoft.com/office/powerpoint/2010/main" val="1380319070"/>
+      </p:ext>
+    </p:extLst>
+  </p:cSld>
+  <p:clrMapOvr>
+    <a:masterClrMapping/>
+  </p:clrMapOvr>
+</p:notes>
+</file>
+
+<file path=ppt/notesSlides/notesSlide26.xml><?xml version="1.0" encoding="utf-8"?>
+<p:notes xmlns:a="http://schemas.openxmlformats.org/drawingml/2006/main" xmlns:r="http://schemas.openxmlformats.org/officeDocument/2006/relationships" xmlns:p="http://schemas.openxmlformats.org/presentationml/2006/main">
+  <p:cSld>
+    <p:spTree>
+      <p:nvGrpSpPr>
+        <p:cNvPr id="1" name=""/>
+        <p:cNvGrpSpPr/>
+        <p:nvPr/>
+      </p:nvGrpSpPr>
+      <p:grpSpPr>
+        <a:xfrm>
+          <a:off x="0" y="0"/>
+          <a:ext cx="0" cy="0"/>
+          <a:chOff x="0" y="0"/>
+          <a:chExt cx="0" cy="0"/>
+        </a:xfrm>
+      </p:grpSpPr>
+      <p:sp>
+        <p:nvSpPr>
+          <p:cNvPr id="2" name="Slide Image Placeholder 1"/>
+          <p:cNvSpPr>
+            <a:spLocks noGrp="1" noRot="1" noChangeAspect="1"/>
+          </p:cNvSpPr>
+          <p:nvPr>
+            <p:ph type="sldImg"/>
+          </p:nvPr>
+        </p:nvSpPr>
+        <p:spPr/>
+      </p:sp>
+      <p:sp>
+        <p:nvSpPr>
+          <p:cNvPr id="3" name="Notes Placeholder 2"/>
+          <p:cNvSpPr>
+            <a:spLocks noGrp="1"/>
+          </p:cNvSpPr>
+          <p:nvPr>
+            <p:ph type="body" idx="1"/>
+          </p:nvPr>
+        </p:nvSpPr>
+        <p:spPr/>
+        <p:txBody>
+          <a:bodyPr/>
+          <a:lstStyle/>
+          <a:p>
+            <a:endParaRPr lang="en-US" dirty="0"/>
+          </a:p>
+        </p:txBody>
+      </p:sp>
+      <p:sp>
+        <p:nvSpPr>
+          <p:cNvPr id="4" name="Slide Number Placeholder 3"/>
+          <p:cNvSpPr>
+            <a:spLocks noGrp="1"/>
+          </p:cNvSpPr>
+          <p:nvPr>
+            <p:ph type="sldNum" sz="quarter" idx="10"/>
+          </p:nvPr>
+        </p:nvSpPr>
+        <p:spPr/>
+        <p:txBody>
+          <a:bodyPr/>
+          <a:lstStyle/>
+          <a:p>
+            <a:fld id="{60DB96F3-AB3B-4A44-870F-2FBB5484A874}" type="slidenum">
+              <a:rPr lang="en-PH" smtClean="0"/>
+              <a:t>27</a:t>
+            </a:fld>
+            <a:endParaRPr lang="en-PH"/>
+          </a:p>
+        </p:txBody>
+      </p:sp>
+    </p:spTree>
+    <p:extLst>
+      <p:ext uri="{BB962C8B-B14F-4D97-AF65-F5344CB8AC3E}">
         <p14:creationId xmlns:p14="http://schemas.microsoft.com/office/powerpoint/2010/main" val="3934669446"/>
       </p:ext>
     </p:extLst>
@@ -14799,7 +16026,7 @@
               </a:rPr>
               <a:t>Most previous CNN image processing solutions target objects that occupy a large proportion of an image, and</a:t>
             </a:r>
-            <a:br>
+            <a:r>
               <a:rPr lang="en-US" sz="1200" i="0" kern="1200" dirty="0">
                 <a:solidFill>
                   <a:schemeClr val="tx1"/>
@@ -14809,9 +16036,10 @@
                 <a:ea typeface="+mn-ea"/>
                 <a:cs typeface="+mn-cs"/>
               </a:rPr>
-            </a:br>
-            <a:r>
-              <a:rPr lang="en-US" sz="1200" i="1" kern="1200" dirty="0">
+              <a:t/>
+            </a:r>
+            <a:br>
+              <a:rPr lang="en-US" sz="1200" i="0" kern="1200" dirty="0">
                 <a:solidFill>
                   <a:schemeClr val="tx1"/>
                 </a:solidFill>
@@ -14820,10 +16048,9 @@
                 <a:ea typeface="+mn-ea"/>
                 <a:cs typeface="+mn-cs"/>
               </a:rPr>
-              <a:t>such networks do not work well for target objects occupying only a small fraction of an image like the traffic-signs</a:t>
-            </a:r>
-            <a:br>
-              <a:rPr lang="en-US" sz="1200" i="0" kern="1200" dirty="0">
+            </a:br>
+            <a:r>
+              <a:rPr lang="en-US" sz="1200" i="1" kern="1200" dirty="0">
                 <a:solidFill>
                   <a:schemeClr val="tx1"/>
                 </a:solidFill>
@@ -14832,9 +16059,10 @@
                 <a:ea typeface="+mn-ea"/>
                 <a:cs typeface="+mn-cs"/>
               </a:rPr>
-            </a:br>
-            <a:r>
-              <a:rPr lang="en-US" sz="1200" i="1" kern="1200" dirty="0">
+              <a:t>such networks do not work well for target objects occupying only a small fraction of an image like the traffic-signs</a:t>
+            </a:r>
+            <a:r>
+              <a:rPr lang="en-US" sz="1200" i="0" kern="1200" dirty="0">
                 <a:solidFill>
                   <a:schemeClr val="tx1"/>
                 </a:solidFill>
@@ -14843,7 +16071,42 @@
                 <a:ea typeface="+mn-ea"/>
                 <a:cs typeface="+mn-cs"/>
               </a:rPr>
+              <a:t/>
+            </a:r>
+            <a:br>
+              <a:rPr lang="en-US" sz="1200" i="0" kern="1200" dirty="0">
+                <a:solidFill>
+                  <a:schemeClr val="tx1"/>
+                </a:solidFill>
+                <a:effectLst/>
+                <a:latin typeface="+mn-lt"/>
+                <a:ea typeface="+mn-ea"/>
+                <a:cs typeface="+mn-cs"/>
+              </a:rPr>
+            </a:br>
+            <a:r>
+              <a:rPr lang="en-US" sz="1200" i="1" kern="1200" dirty="0">
+                <a:solidFill>
+                  <a:schemeClr val="tx1"/>
+                </a:solidFill>
+                <a:effectLst/>
+                <a:latin typeface="+mn-lt"/>
+                <a:ea typeface="+mn-ea"/>
+                <a:cs typeface="+mn-cs"/>
+              </a:rPr>
               <a:t>here.</a:t>
+            </a:r>
+            <a:r>
+              <a:rPr lang="en-US" sz="1200" i="0" kern="1200" dirty="0">
+                <a:solidFill>
+                  <a:schemeClr val="tx1"/>
+                </a:solidFill>
+                <a:effectLst/>
+                <a:latin typeface="+mn-lt"/>
+                <a:ea typeface="+mn-ea"/>
+                <a:cs typeface="+mn-cs"/>
+              </a:rPr>
+              <a:t/>
             </a:r>
             <a:br>
               <a:rPr lang="en-US" sz="1200" i="0" kern="1200" dirty="0">
@@ -15071,7 +16334,7 @@
               </a:rPr>
               <a:t>Most previous CNN image processing solutions target objects that occupy a large proportion of an image, and</a:t>
             </a:r>
-            <a:br>
+            <a:r>
               <a:rPr lang="en-US" sz="1200" i="0" kern="1200" dirty="0">
                 <a:solidFill>
                   <a:schemeClr val="tx1"/>
@@ -15081,9 +16344,10 @@
                 <a:ea typeface="+mn-ea"/>
                 <a:cs typeface="+mn-cs"/>
               </a:rPr>
-            </a:br>
-            <a:r>
-              <a:rPr lang="en-US" sz="1200" i="1" kern="1200" dirty="0">
+              <a:t/>
+            </a:r>
+            <a:br>
+              <a:rPr lang="en-US" sz="1200" i="0" kern="1200" dirty="0">
                 <a:solidFill>
                   <a:schemeClr val="tx1"/>
                 </a:solidFill>
@@ -15092,10 +16356,9 @@
                 <a:ea typeface="+mn-ea"/>
                 <a:cs typeface="+mn-cs"/>
               </a:rPr>
-              <a:t>such networks do not work well for target objects occupying only a small fraction of an image like the traffic-signs</a:t>
-            </a:r>
-            <a:br>
-              <a:rPr lang="en-US" sz="1200" i="0" kern="1200" dirty="0">
+            </a:br>
+            <a:r>
+              <a:rPr lang="en-US" sz="1200" i="1" kern="1200" dirty="0">
                 <a:solidFill>
                   <a:schemeClr val="tx1"/>
                 </a:solidFill>
@@ -15104,9 +16367,10 @@
                 <a:ea typeface="+mn-ea"/>
                 <a:cs typeface="+mn-cs"/>
               </a:rPr>
-            </a:br>
-            <a:r>
-              <a:rPr lang="en-US" sz="1200" i="1" kern="1200" dirty="0">
+              <a:t>such networks do not work well for target objects occupying only a small fraction of an image like the traffic-signs</a:t>
+            </a:r>
+            <a:r>
+              <a:rPr lang="en-US" sz="1200" i="0" kern="1200" dirty="0">
                 <a:solidFill>
                   <a:schemeClr val="tx1"/>
                 </a:solidFill>
@@ -15115,7 +16379,42 @@
                 <a:ea typeface="+mn-ea"/>
                 <a:cs typeface="+mn-cs"/>
               </a:rPr>
+              <a:t/>
+            </a:r>
+            <a:br>
+              <a:rPr lang="en-US" sz="1200" i="0" kern="1200" dirty="0">
+                <a:solidFill>
+                  <a:schemeClr val="tx1"/>
+                </a:solidFill>
+                <a:effectLst/>
+                <a:latin typeface="+mn-lt"/>
+                <a:ea typeface="+mn-ea"/>
+                <a:cs typeface="+mn-cs"/>
+              </a:rPr>
+            </a:br>
+            <a:r>
+              <a:rPr lang="en-US" sz="1200" i="1" kern="1200" dirty="0">
+                <a:solidFill>
+                  <a:schemeClr val="tx1"/>
+                </a:solidFill>
+                <a:effectLst/>
+                <a:latin typeface="+mn-lt"/>
+                <a:ea typeface="+mn-ea"/>
+                <a:cs typeface="+mn-cs"/>
+              </a:rPr>
               <a:t>here.</a:t>
+            </a:r>
+            <a:r>
+              <a:rPr lang="en-US" sz="1200" i="0" kern="1200" dirty="0">
+                <a:solidFill>
+                  <a:schemeClr val="tx1"/>
+                </a:solidFill>
+                <a:effectLst/>
+                <a:latin typeface="+mn-lt"/>
+                <a:ea typeface="+mn-ea"/>
+                <a:cs typeface="+mn-cs"/>
+              </a:rPr>
+              <a:t/>
             </a:r>
             <a:br>
               <a:rPr lang="en-US" sz="1200" i="0" kern="1200" dirty="0">
@@ -15407,7 +16706,7 @@
               </a:rPr>
               <a:t>imag</a:t>
             </a:r>
-            <a:br>
+            <a:r>
               <a:rPr lang="en-US" sz="1200" i="0" kern="1200" dirty="0">
                 <a:solidFill>
                   <a:schemeClr val="tx1"/>
@@ -15417,7 +16716,31 @@
                 <a:ea typeface="+mn-ea"/>
                 <a:cs typeface="+mn-cs"/>
               </a:rPr>
+              <a:t/>
+            </a:r>
+            <a:br>
+              <a:rPr lang="en-US" sz="1200" i="0" kern="1200" dirty="0">
+                <a:solidFill>
+                  <a:schemeClr val="tx1"/>
+                </a:solidFill>
+                <a:effectLst/>
+                <a:latin typeface="+mn-lt"/>
+                <a:ea typeface="+mn-ea"/>
+                <a:cs typeface="+mn-cs"/>
+              </a:rPr>
             </a:br>
+            <a:r>
+              <a:rPr lang="en-US" sz="1200" i="0" kern="1200" dirty="0">
+                <a:solidFill>
+                  <a:schemeClr val="tx1"/>
+                </a:solidFill>
+                <a:effectLst/>
+                <a:latin typeface="+mn-lt"/>
+                <a:ea typeface="+mn-ea"/>
+                <a:cs typeface="+mn-cs"/>
+              </a:rPr>
+              <a:t/>
+            </a:r>
             <a:br>
               <a:rPr lang="en-US" sz="1200" i="0" kern="1200" dirty="0">
                 <a:solidFill>
@@ -15757,7 +17080,7 @@
               </a:rPr>
               <a:t>imag</a:t>
             </a:r>
-            <a:br>
+            <a:r>
               <a:rPr lang="en-US" sz="1200" i="0" kern="1200" dirty="0">
                 <a:solidFill>
                   <a:schemeClr val="tx1"/>
@@ -15767,7 +17090,31 @@
                 <a:ea typeface="+mn-ea"/>
                 <a:cs typeface="+mn-cs"/>
               </a:rPr>
+              <a:t/>
+            </a:r>
+            <a:br>
+              <a:rPr lang="en-US" sz="1200" i="0" kern="1200" dirty="0">
+                <a:solidFill>
+                  <a:schemeClr val="tx1"/>
+                </a:solidFill>
+                <a:effectLst/>
+                <a:latin typeface="+mn-lt"/>
+                <a:ea typeface="+mn-ea"/>
+                <a:cs typeface="+mn-cs"/>
+              </a:rPr>
             </a:br>
+            <a:r>
+              <a:rPr lang="en-US" sz="1200" i="0" kern="1200" dirty="0">
+                <a:solidFill>
+                  <a:schemeClr val="tx1"/>
+                </a:solidFill>
+                <a:effectLst/>
+                <a:latin typeface="+mn-lt"/>
+                <a:ea typeface="+mn-ea"/>
+                <a:cs typeface="+mn-cs"/>
+              </a:rPr>
+              <a:t/>
+            </a:r>
             <a:br>
               <a:rPr lang="en-US" sz="1200" i="0" kern="1200" dirty="0">
                 <a:solidFill>
@@ -16123,7 +17470,7 @@
                 <a:cs typeface="+mn-cs"/>
               </a:rPr>
             </a:br>
-            <a:br>
+            <a:r>
               <a:rPr lang="en-US" sz="1200" i="0" kern="1200" dirty="0">
                 <a:solidFill>
                   <a:schemeClr val="tx1"/>
@@ -16133,7 +17480,31 @@
                 <a:ea typeface="+mn-ea"/>
                 <a:cs typeface="+mn-cs"/>
               </a:rPr>
+              <a:t/>
+            </a:r>
+            <a:br>
+              <a:rPr lang="en-US" sz="1200" i="0" kern="1200" dirty="0">
+                <a:solidFill>
+                  <a:schemeClr val="tx1"/>
+                </a:solidFill>
+                <a:effectLst/>
+                <a:latin typeface="+mn-lt"/>
+                <a:ea typeface="+mn-ea"/>
+                <a:cs typeface="+mn-cs"/>
+              </a:rPr>
             </a:br>
+            <a:r>
+              <a:rPr lang="en-US" sz="1200" i="0" kern="1200" dirty="0">
+                <a:solidFill>
+                  <a:schemeClr val="tx1"/>
+                </a:solidFill>
+                <a:effectLst/>
+                <a:latin typeface="Times New Roman" panose="02020603050405020304" pitchFamily="18" charset="0"/>
+                <a:ea typeface="+mn-ea"/>
+                <a:cs typeface="Times New Roman" panose="02020603050405020304" pitchFamily="18" charset="0"/>
+              </a:rPr>
+              <a:t/>
+            </a:r>
             <a:br>
               <a:rPr lang="en-US" sz="1200" i="0" kern="1200" dirty="0">
                 <a:solidFill>
@@ -16550,7 +17921,7 @@
               </a:rPr>
               <a:t>region proposal networks</a:t>
             </a:r>
-            <a:br>
+            <a:r>
               <a:rPr lang="en-US" sz="1200" i="0" kern="1200" dirty="0">
                 <a:solidFill>
                   <a:schemeClr val="tx1"/>
@@ -16560,8 +17931,9 @@
                 <a:ea typeface="+mn-ea"/>
                 <a:cs typeface="+mn-cs"/>
               </a:rPr>
-            </a:br>
-            <a:r>
+              <a:t/>
+            </a:r>
+            <a:br>
               <a:rPr lang="en-US" sz="1200" i="0" kern="1200" dirty="0">
                 <a:solidFill>
                   <a:schemeClr val="tx1"/>
@@ -16571,9 +17943,8 @@
                 <a:ea typeface="+mn-ea"/>
                 <a:cs typeface="+mn-cs"/>
               </a:rPr>
-              <a:t>(RPNs) which use convolutional feature maps to generate</a:t>
-            </a:r>
-            <a:br>
+            </a:br>
+            <a:r>
               <a:rPr lang="en-US" sz="1200" i="0" kern="1200" dirty="0">
                 <a:solidFill>
                   <a:schemeClr val="tx1"/>
@@ -16583,8 +17954,9 @@
                 <a:ea typeface="+mn-ea"/>
                 <a:cs typeface="+mn-cs"/>
               </a:rPr>
-            </a:br>
-            <a:r>
+              <a:t>(RPNs) which use convolutional feature maps to generate</a:t>
+            </a:r>
+            <a:br>
               <a:rPr lang="en-US" sz="1200" i="0" kern="1200" dirty="0">
                 <a:solidFill>
                   <a:schemeClr val="tx1"/>
@@ -16594,9 +17966,8 @@
                 <a:ea typeface="+mn-ea"/>
                 <a:cs typeface="+mn-cs"/>
               </a:rPr>
-              <a:t>object proposals. This allows the object proposal generator</a:t>
-            </a:r>
-            <a:br>
+            </a:br>
+            <a:r>
               <a:rPr lang="en-US" sz="1200" i="0" kern="1200" dirty="0">
                 <a:solidFill>
                   <a:schemeClr val="tx1"/>
@@ -16606,8 +17977,9 @@
                 <a:ea typeface="+mn-ea"/>
                 <a:cs typeface="+mn-cs"/>
               </a:rPr>
-            </a:br>
-            <a:r>
+              <a:t>object proposals. This allows the object proposal generator</a:t>
+            </a:r>
+            <a:br>
               <a:rPr lang="en-US" sz="1200" i="0" kern="1200" dirty="0">
                 <a:solidFill>
                   <a:schemeClr val="tx1"/>
@@ -16617,9 +17989,8 @@
                 <a:ea typeface="+mn-ea"/>
                 <a:cs typeface="+mn-cs"/>
               </a:rPr>
-              <a:t>to share full-image convolutional features with the detection</a:t>
-            </a:r>
-            <a:br>
+            </a:br>
+            <a:r>
               <a:rPr lang="en-US" sz="1200" i="0" kern="1200" dirty="0">
                 <a:solidFill>
                   <a:schemeClr val="tx1"/>
@@ -16629,8 +18000,9 @@
                 <a:ea typeface="+mn-ea"/>
                 <a:cs typeface="+mn-cs"/>
               </a:rPr>
-            </a:br>
-            <a:r>
+              <a:t>to share full-image convolutional features with the detection</a:t>
+            </a:r>
+            <a:br>
               <a:rPr lang="en-US" sz="1200" i="0" kern="1200" dirty="0">
                 <a:solidFill>
                   <a:schemeClr val="tx1"/>
@@ -16640,9 +18012,8 @@
                 <a:ea typeface="+mn-ea"/>
                 <a:cs typeface="+mn-cs"/>
               </a:rPr>
-              <a:t>network, allowing their detection system to achieve a frame</a:t>
-            </a:r>
-            <a:br>
+            </a:br>
+            <a:r>
               <a:rPr lang="en-US" sz="1200" i="0" kern="1200" dirty="0">
                 <a:solidFill>
                   <a:schemeClr val="tx1"/>
@@ -16652,8 +18023,9 @@
                 <a:ea typeface="+mn-ea"/>
                 <a:cs typeface="+mn-cs"/>
               </a:rPr>
-            </a:br>
-            <a:r>
+              <a:t>network, allowing their detection system to achieve a frame</a:t>
+            </a:r>
+            <a:br>
               <a:rPr lang="en-US" sz="1200" i="0" kern="1200" dirty="0">
                 <a:solidFill>
                   <a:schemeClr val="tx1"/>
@@ -16663,9 +18035,8 @@
                 <a:ea typeface="+mn-ea"/>
                 <a:cs typeface="+mn-cs"/>
               </a:rPr>
-              <a:t>rate of 5 fps on a powerful GPU.</a:t>
-            </a:r>
-            <a:br>
+            </a:br>
+            <a:r>
               <a:rPr lang="en-US" sz="1200" i="0" kern="1200" dirty="0">
                 <a:solidFill>
                   <a:schemeClr val="tx1"/>
@@ -16675,7 +18046,31 @@
                 <a:ea typeface="+mn-ea"/>
                 <a:cs typeface="+mn-cs"/>
               </a:rPr>
+              <a:t>rate of 5 fps on a powerful GPU.</a:t>
+            </a:r>
+            <a:br>
+              <a:rPr lang="en-US" sz="1200" i="0" kern="1200" dirty="0">
+                <a:solidFill>
+                  <a:schemeClr val="tx1"/>
+                </a:solidFill>
+                <a:effectLst/>
+                <a:latin typeface="+mn-lt"/>
+                <a:ea typeface="+mn-ea"/>
+                <a:cs typeface="+mn-cs"/>
+              </a:rPr>
             </a:br>
+            <a:r>
+              <a:rPr lang="en-US" sz="1200" i="0" kern="1200" dirty="0">
+                <a:solidFill>
+                  <a:schemeClr val="tx1"/>
+                </a:solidFill>
+                <a:effectLst/>
+                <a:latin typeface="+mn-lt"/>
+                <a:ea typeface="+mn-ea"/>
+                <a:cs typeface="+mn-cs"/>
+              </a:rPr>
+              <a:t/>
+            </a:r>
             <a:br>
               <a:rPr lang="en-US" sz="1200" i="0" kern="1200" dirty="0">
                 <a:solidFill>
@@ -17302,7 +18697,7 @@
             <a:fld id="{1D8BD707-D9CF-40AE-B4C6-C98DA3205C09}" type="datetimeFigureOut">
               <a:rPr lang="en-US" smtClean="0"/>
               <a:pPr/>
-              <a:t>3/12/2021</a:t>
+              <a:t>3/13/2021</a:t>
             </a:fld>
             <a:endParaRPr lang="en-US"/>
           </a:p>
@@ -17467,7 +18862,7 @@
             <a:fld id="{1D8BD707-D9CF-40AE-B4C6-C98DA3205C09}" type="datetimeFigureOut">
               <a:rPr lang="en-US" smtClean="0"/>
               <a:pPr/>
-              <a:t>3/12/2021</a:t>
+              <a:t>3/13/2021</a:t>
             </a:fld>
             <a:endParaRPr lang="en-US"/>
           </a:p>
@@ -17642,7 +19037,7 @@
             <a:fld id="{1D8BD707-D9CF-40AE-B4C6-C98DA3205C09}" type="datetimeFigureOut">
               <a:rPr lang="en-US" smtClean="0"/>
               <a:pPr/>
-              <a:t>3/12/2021</a:t>
+              <a:t>3/13/2021</a:t>
             </a:fld>
             <a:endParaRPr lang="en-US"/>
           </a:p>
@@ -17807,7 +19202,7 @@
             <a:fld id="{1D8BD707-D9CF-40AE-B4C6-C98DA3205C09}" type="datetimeFigureOut">
               <a:rPr lang="en-US" smtClean="0"/>
               <a:pPr/>
-              <a:t>3/12/2021</a:t>
+              <a:t>3/13/2021</a:t>
             </a:fld>
             <a:endParaRPr lang="en-US"/>
           </a:p>
@@ -18052,7 +19447,7 @@
             <a:fld id="{1D8BD707-D9CF-40AE-B4C6-C98DA3205C09}" type="datetimeFigureOut">
               <a:rPr lang="en-US" smtClean="0"/>
               <a:pPr/>
-              <a:t>3/12/2021</a:t>
+              <a:t>3/13/2021</a:t>
             </a:fld>
             <a:endParaRPr lang="en-US"/>
           </a:p>
@@ -18334,7 +19729,7 @@
             <a:fld id="{1D8BD707-D9CF-40AE-B4C6-C98DA3205C09}" type="datetimeFigureOut">
               <a:rPr lang="en-US" smtClean="0"/>
               <a:pPr/>
-              <a:t>3/12/2021</a:t>
+              <a:t>3/13/2021</a:t>
             </a:fld>
             <a:endParaRPr lang="en-US"/>
           </a:p>
@@ -18754,7 +20149,7 @@
             <a:fld id="{1D8BD707-D9CF-40AE-B4C6-C98DA3205C09}" type="datetimeFigureOut">
               <a:rPr lang="en-US" smtClean="0"/>
               <a:pPr/>
-              <a:t>3/12/2021</a:t>
+              <a:t>3/13/2021</a:t>
             </a:fld>
             <a:endParaRPr lang="en-US"/>
           </a:p>
@@ -18868,7 +20263,7 @@
             <a:fld id="{1D8BD707-D9CF-40AE-B4C6-C98DA3205C09}" type="datetimeFigureOut">
               <a:rPr lang="en-US" smtClean="0"/>
               <a:pPr/>
-              <a:t>3/12/2021</a:t>
+              <a:t>3/13/2021</a:t>
             </a:fld>
             <a:endParaRPr lang="en-US"/>
           </a:p>
@@ -18960,7 +20355,7 @@
             <a:fld id="{1D8BD707-D9CF-40AE-B4C6-C98DA3205C09}" type="datetimeFigureOut">
               <a:rPr lang="en-US" smtClean="0"/>
               <a:pPr/>
-              <a:t>3/12/2021</a:t>
+              <a:t>3/13/2021</a:t>
             </a:fld>
             <a:endParaRPr lang="en-US"/>
           </a:p>
@@ -19232,7 +20627,7 @@
             <a:fld id="{1D8BD707-D9CF-40AE-B4C6-C98DA3205C09}" type="datetimeFigureOut">
               <a:rPr lang="en-US" smtClean="0"/>
               <a:pPr/>
-              <a:t>3/12/2021</a:t>
+              <a:t>3/13/2021</a:t>
             </a:fld>
             <a:endParaRPr lang="en-US"/>
           </a:p>
@@ -19486,7 +20881,7 @@
             <a:fld id="{1D8BD707-D9CF-40AE-B4C6-C98DA3205C09}" type="datetimeFigureOut">
               <a:rPr lang="en-US" smtClean="0"/>
               <a:pPr/>
-              <a:t>3/12/2021</a:t>
+              <a:t>3/13/2021</a:t>
             </a:fld>
             <a:endParaRPr lang="en-US"/>
           </a:p>
@@ -19703,7 +21098,7 @@
             <a:fld id="{1D8BD707-D9CF-40AE-B4C6-C98DA3205C09}" type="datetimeFigureOut">
               <a:rPr lang="en-US" smtClean="0"/>
               <a:pPr/>
-              <a:t>3/12/2021</a:t>
+              <a:t>3/13/2021</a:t>
             </a:fld>
             <a:endParaRPr lang="en-US"/>
           </a:p>
@@ -24326,14 +25721,14 @@
               <a:buChar char="q"/>
             </a:pPr>
             <a:r>
-              <a:rPr lang="en-US" sz="3200" b="1" dirty="0">
+              <a:rPr lang="en-US" sz="3200" b="1" dirty="0" smtClean="0">
                 <a:solidFill>
                   <a:schemeClr val="bg1"/>
                 </a:solidFill>
                 <a:latin typeface="Times New Roman" panose="02020603050405020304" pitchFamily="18" charset="0"/>
                 <a:cs typeface="Times New Roman" panose="02020603050405020304" pitchFamily="18" charset="0"/>
               </a:rPr>
-              <a:t>Architecture</a:t>
+              <a:t>Architecture of last model</a:t>
             </a:r>
           </a:p>
         </p:txBody>
@@ -24454,6 +25849,80 @@
           </p:txBody>
         </p:sp>
       </p:grpSp>
+      <p:sp>
+        <p:nvSpPr>
+          <p:cNvPr id="2" name="Rectangle 1"/>
+          <p:cNvSpPr/>
+          <p:nvPr/>
+        </p:nvSpPr>
+        <p:spPr>
+          <a:xfrm>
+            <a:off x="1219200" y="1860621"/>
+            <a:ext cx="1510350" cy="523220"/>
+          </a:xfrm>
+          <a:prstGeom prst="rect">
+            <a:avLst/>
+          </a:prstGeom>
+        </p:spPr>
+        <p:txBody>
+          <a:bodyPr wrap="none">
+            <a:spAutoFit/>
+          </a:bodyPr>
+          <a:lstStyle/>
+          <a:p>
+            <a:r>
+              <a:rPr lang="en-US" sz="2800" dirty="0" err="1">
+                <a:solidFill>
+                  <a:schemeClr val="bg1"/>
+                </a:solidFill>
+                <a:latin typeface="Times New Roman" panose="02020603050405020304" pitchFamily="18" charset="0"/>
+                <a:cs typeface="Times New Roman" panose="02020603050405020304" pitchFamily="18" charset="0"/>
+              </a:rPr>
+              <a:t>AlexNet</a:t>
+            </a:r>
+            <a:r>
+              <a:rPr lang="en-US" sz="2800" dirty="0">
+                <a:solidFill>
+                  <a:schemeClr val="bg1"/>
+                </a:solidFill>
+                <a:latin typeface="Times New Roman" panose="02020603050405020304" pitchFamily="18" charset="0"/>
+                <a:cs typeface="Times New Roman" panose="02020603050405020304" pitchFamily="18" charset="0"/>
+              </a:rPr>
+              <a:t> </a:t>
+            </a:r>
+          </a:p>
+        </p:txBody>
+      </p:sp>
+      <p:pic>
+        <p:nvPicPr>
+          <p:cNvPr id="4" name="Picture 3"/>
+          <p:cNvPicPr>
+            <a:picLocks noChangeAspect="1"/>
+          </p:cNvPicPr>
+          <p:nvPr/>
+        </p:nvPicPr>
+        <p:blipFill>
+          <a:blip r:embed="rId3">
+            <a:extLst>
+              <a:ext uri="{28A0092B-C50C-407E-A947-70E740481C1C}">
+                <a14:useLocalDpi xmlns:a14="http://schemas.microsoft.com/office/drawing/2010/main" val="0"/>
+              </a:ext>
+            </a:extLst>
+          </a:blip>
+          <a:stretch>
+            <a:fillRect/>
+          </a:stretch>
+        </p:blipFill>
+        <p:spPr>
+          <a:xfrm>
+            <a:off x="3045515" y="1898721"/>
+            <a:ext cx="8077200" cy="4543425"/>
+          </a:xfrm>
+          <a:prstGeom prst="rect">
+            <a:avLst/>
+          </a:prstGeom>
+        </p:spPr>
+      </p:pic>
     </p:spTree>
     <p:extLst>
       <p:ext uri="{BB962C8B-B14F-4D97-AF65-F5344CB8AC3E}">
@@ -24464,6 +25933,13 @@
   <p:clrMapOvr>
     <a:masterClrMapping/>
   </p:clrMapOvr>
+  <p:timing>
+    <p:tnLst>
+      <p:par>
+        <p:cTn id="1" dur="indefinite" restart="never" nodeType="tmRoot"/>
+      </p:par>
+    </p:tnLst>
+  </p:timing>
 </p:sld>
 </file>
 
@@ -24511,14 +25987,14 @@
               <a:buChar char="q"/>
             </a:pPr>
             <a:r>
-              <a:rPr lang="en-US" sz="3200" b="1" dirty="0">
+              <a:rPr lang="en-US" sz="3200" b="1" dirty="0" smtClean="0">
                 <a:solidFill>
                   <a:schemeClr val="bg1"/>
                 </a:solidFill>
                 <a:latin typeface="Times New Roman" panose="02020603050405020304" pitchFamily="18" charset="0"/>
                 <a:cs typeface="Times New Roman" panose="02020603050405020304" pitchFamily="18" charset="0"/>
               </a:rPr>
-              <a:t>Training</a:t>
+              <a:t>Architecture of last model</a:t>
             </a:r>
           </a:p>
         </p:txBody>
@@ -24639,16 +26115,285 @@
           </p:txBody>
         </p:sp>
       </p:grpSp>
+      <p:sp>
+        <p:nvSpPr>
+          <p:cNvPr id="2" name="Rectangle 1"/>
+          <p:cNvSpPr/>
+          <p:nvPr/>
+        </p:nvSpPr>
+        <p:spPr>
+          <a:xfrm>
+            <a:off x="1219200" y="1860621"/>
+            <a:ext cx="1609736" cy="523220"/>
+          </a:xfrm>
+          <a:prstGeom prst="rect">
+            <a:avLst/>
+          </a:prstGeom>
+        </p:spPr>
+        <p:txBody>
+          <a:bodyPr wrap="none">
+            <a:spAutoFit/>
+          </a:bodyPr>
+          <a:lstStyle/>
+          <a:p>
+            <a:r>
+              <a:rPr lang="en-US" sz="2800" dirty="0" err="1" smtClean="0">
+                <a:solidFill>
+                  <a:schemeClr val="bg1"/>
+                </a:solidFill>
+                <a:latin typeface="Times New Roman" panose="02020603050405020304" pitchFamily="18" charset="0"/>
+                <a:cs typeface="Times New Roman" panose="02020603050405020304" pitchFamily="18" charset="0"/>
+              </a:rPr>
+              <a:t>OverFeat</a:t>
+            </a:r>
+            <a:r>
+              <a:rPr lang="en-US" sz="2800" dirty="0">
+                <a:solidFill>
+                  <a:schemeClr val="bg1"/>
+                </a:solidFill>
+                <a:latin typeface="Times New Roman" panose="02020603050405020304" pitchFamily="18" charset="0"/>
+                <a:cs typeface="Times New Roman" panose="02020603050405020304" pitchFamily="18" charset="0"/>
+              </a:rPr>
+              <a:t> </a:t>
+            </a:r>
+          </a:p>
+        </p:txBody>
+      </p:sp>
+      <p:pic>
+        <p:nvPicPr>
+          <p:cNvPr id="3" name="Picture 2"/>
+          <p:cNvPicPr>
+            <a:picLocks noChangeAspect="1"/>
+          </p:cNvPicPr>
+          <p:nvPr/>
+        </p:nvPicPr>
+        <p:blipFill>
+          <a:blip r:embed="rId3">
+            <a:extLst>
+              <a:ext uri="{28A0092B-C50C-407E-A947-70E740481C1C}">
+                <a14:useLocalDpi xmlns:a14="http://schemas.microsoft.com/office/drawing/2010/main" val="0"/>
+              </a:ext>
+            </a:extLst>
+          </a:blip>
+          <a:stretch>
+            <a:fillRect/>
+          </a:stretch>
+        </p:blipFill>
+        <p:spPr>
+          <a:xfrm>
+            <a:off x="1021217" y="2590800"/>
+            <a:ext cx="10120548" cy="2449816"/>
+          </a:xfrm>
+          <a:prstGeom prst="rect">
+            <a:avLst/>
+          </a:prstGeom>
+        </p:spPr>
+      </p:pic>
+      <p:pic>
+        <p:nvPicPr>
+          <p:cNvPr id="5" name="Picture 4"/>
+          <p:cNvPicPr>
+            <a:picLocks noChangeAspect="1"/>
+          </p:cNvPicPr>
+          <p:nvPr/>
+        </p:nvPicPr>
+        <p:blipFill>
+          <a:blip r:embed="rId4">
+            <a:extLst>
+              <a:ext uri="{28A0092B-C50C-407E-A947-70E740481C1C}">
+                <a14:useLocalDpi xmlns:a14="http://schemas.microsoft.com/office/drawing/2010/main" val="0"/>
+              </a:ext>
+            </a:extLst>
+          </a:blip>
+          <a:stretch>
+            <a:fillRect/>
+          </a:stretch>
+        </p:blipFill>
+        <p:spPr>
+          <a:xfrm>
+            <a:off x="2283515" y="2345741"/>
+            <a:ext cx="7200900" cy="4067175"/>
+          </a:xfrm>
+          <a:prstGeom prst="rect">
+            <a:avLst/>
+          </a:prstGeom>
+        </p:spPr>
+      </p:pic>
     </p:spTree>
     <p:extLst>
       <p:ext uri="{BB962C8B-B14F-4D97-AF65-F5344CB8AC3E}">
-        <p14:creationId xmlns:p14="http://schemas.microsoft.com/office/powerpoint/2010/main" val="2634641224"/>
+        <p14:creationId xmlns:p14="http://schemas.microsoft.com/office/powerpoint/2010/main" val="3349886126"/>
       </p:ext>
     </p:extLst>
   </p:cSld>
   <p:clrMapOvr>
     <a:masterClrMapping/>
   </p:clrMapOvr>
+  <p:timing>
+    <p:tnLst>
+      <p:par>
+        <p:cTn id="1" dur="indefinite" restart="never" nodeType="tmRoot">
+          <p:childTnLst>
+            <p:seq concurrent="1" nextAc="seek">
+              <p:cTn id="2" dur="indefinite" nodeType="mainSeq">
+                <p:childTnLst>
+                  <p:par>
+                    <p:cTn id="3" fill="hold">
+                      <p:stCondLst>
+                        <p:cond delay="indefinite"/>
+                      </p:stCondLst>
+                      <p:childTnLst>
+                        <p:par>
+                          <p:cTn id="4" fill="hold">
+                            <p:stCondLst>
+                              <p:cond delay="0"/>
+                            </p:stCondLst>
+                            <p:childTnLst>
+                              <p:par>
+                                <p:cTn id="5" presetID="10" presetClass="exit" presetSubtype="0" fill="hold" nodeType="clickEffect">
+                                  <p:stCondLst>
+                                    <p:cond delay="0"/>
+                                  </p:stCondLst>
+                                  <p:childTnLst>
+                                    <p:animEffect transition="out" filter="fade">
+                                      <p:cBhvr>
+                                        <p:cTn id="6" dur="500"/>
+                                        <p:tgtEl>
+                                          <p:spTgt spid="3"/>
+                                        </p:tgtEl>
+                                      </p:cBhvr>
+                                    </p:animEffect>
+                                    <p:set>
+                                      <p:cBhvr>
+                                        <p:cTn id="7" dur="1" fill="hold">
+                                          <p:stCondLst>
+                                            <p:cond delay="499"/>
+                                          </p:stCondLst>
+                                        </p:cTn>
+                                        <p:tgtEl>
+                                          <p:spTgt spid="3"/>
+                                        </p:tgtEl>
+                                        <p:attrNameLst>
+                                          <p:attrName>style.visibility</p:attrName>
+                                        </p:attrNameLst>
+                                      </p:cBhvr>
+                                      <p:to>
+                                        <p:strVal val="hidden"/>
+                                      </p:to>
+                                    </p:set>
+                                  </p:childTnLst>
+                                </p:cTn>
+                              </p:par>
+                            </p:childTnLst>
+                          </p:cTn>
+                        </p:par>
+                        <p:par>
+                          <p:cTn id="8" fill="hold">
+                            <p:stCondLst>
+                              <p:cond delay="500"/>
+                            </p:stCondLst>
+                            <p:childTnLst>
+                              <p:par>
+                                <p:cTn id="9" presetID="2" presetClass="entr" presetSubtype="4" fill="hold" nodeType="afterEffect">
+                                  <p:stCondLst>
+                                    <p:cond delay="0"/>
+                                  </p:stCondLst>
+                                  <p:childTnLst>
+                                    <p:set>
+                                      <p:cBhvr>
+                                        <p:cTn id="10" dur="1" fill="hold">
+                                          <p:stCondLst>
+                                            <p:cond delay="0"/>
+                                          </p:stCondLst>
+                                        </p:cTn>
+                                        <p:tgtEl>
+                                          <p:spTgt spid="5"/>
+                                        </p:tgtEl>
+                                        <p:attrNameLst>
+                                          <p:attrName>style.visibility</p:attrName>
+                                        </p:attrNameLst>
+                                      </p:cBhvr>
+                                      <p:to>
+                                        <p:strVal val="visible"/>
+                                      </p:to>
+                                    </p:set>
+                                    <p:anim calcmode="lin" valueType="num">
+                                      <p:cBhvr additive="base">
+                                        <p:cTn id="11" dur="300" fill="hold"/>
+                                        <p:tgtEl>
+                                          <p:spTgt spid="5"/>
+                                        </p:tgtEl>
+                                        <p:attrNameLst>
+                                          <p:attrName>ppt_x</p:attrName>
+                                        </p:attrNameLst>
+                                      </p:cBhvr>
+                                      <p:tavLst>
+                                        <p:tav tm="0">
+                                          <p:val>
+                                            <p:strVal val="#ppt_x"/>
+                                          </p:val>
+                                        </p:tav>
+                                        <p:tav tm="100000">
+                                          <p:val>
+                                            <p:strVal val="#ppt_x"/>
+                                          </p:val>
+                                        </p:tav>
+                                      </p:tavLst>
+                                    </p:anim>
+                                    <p:anim calcmode="lin" valueType="num">
+                                      <p:cBhvr additive="base">
+                                        <p:cTn id="12" dur="300" fill="hold"/>
+                                        <p:tgtEl>
+                                          <p:spTgt spid="5"/>
+                                        </p:tgtEl>
+                                        <p:attrNameLst>
+                                          <p:attrName>ppt_y</p:attrName>
+                                        </p:attrNameLst>
+                                      </p:cBhvr>
+                                      <p:tavLst>
+                                        <p:tav tm="0">
+                                          <p:val>
+                                            <p:strVal val="1+#ppt_h/2"/>
+                                          </p:val>
+                                        </p:tav>
+                                        <p:tav tm="100000">
+                                          <p:val>
+                                            <p:strVal val="#ppt_y"/>
+                                          </p:val>
+                                        </p:tav>
+                                      </p:tavLst>
+                                    </p:anim>
+                                  </p:childTnLst>
+                                </p:cTn>
+                              </p:par>
+                            </p:childTnLst>
+                          </p:cTn>
+                        </p:par>
+                      </p:childTnLst>
+                    </p:cTn>
+                  </p:par>
+                </p:childTnLst>
+              </p:cTn>
+              <p:prevCondLst>
+                <p:cond evt="onPrev" delay="0">
+                  <p:tgtEl>
+                    <p:sldTgt/>
+                  </p:tgtEl>
+                </p:cond>
+              </p:prevCondLst>
+              <p:nextCondLst>
+                <p:cond evt="onNext" delay="0">
+                  <p:tgtEl>
+                    <p:sldTgt/>
+                  </p:tgtEl>
+                </p:cond>
+              </p:nextCondLst>
+            </p:seq>
+          </p:childTnLst>
+        </p:cTn>
+      </p:par>
+    </p:tnLst>
+  </p:timing>
 </p:sld>
 </file>
 
@@ -24696,15 +26441,244 @@
               <a:buChar char="q"/>
             </a:pPr>
             <a:r>
-              <a:rPr lang="en-US" sz="3200" b="1" dirty="0">
+              <a:rPr lang="en-US" sz="3200" b="1" dirty="0" smtClean="0">
                 <a:solidFill>
                   <a:schemeClr val="bg1"/>
                 </a:solidFill>
                 <a:latin typeface="Times New Roman" panose="02020603050405020304" pitchFamily="18" charset="0"/>
                 <a:cs typeface="Times New Roman" panose="02020603050405020304" pitchFamily="18" charset="0"/>
               </a:rPr>
+              <a:t>Architecture new model</a:t>
+            </a:r>
+          </a:p>
+        </p:txBody>
+      </p:sp>
+      <p:grpSp>
+        <p:nvGrpSpPr>
+          <p:cNvPr id="7" name="Group 6"/>
+          <p:cNvGrpSpPr/>
+          <p:nvPr/>
+        </p:nvGrpSpPr>
+        <p:grpSpPr>
+          <a:xfrm>
+            <a:off x="1600200" y="411387"/>
+            <a:ext cx="9296400" cy="579213"/>
+            <a:chOff x="0" y="2597282"/>
+            <a:chExt cx="9296400" cy="852641"/>
+          </a:xfrm>
+        </p:grpSpPr>
+        <p:sp>
+          <p:nvSpPr>
+            <p:cNvPr id="11" name="Rounded Rectangle 10"/>
+            <p:cNvSpPr/>
+            <p:nvPr/>
+          </p:nvSpPr>
+          <p:spPr>
+            <a:xfrm>
+              <a:off x="0" y="2597282"/>
+              <a:ext cx="9296400" cy="852641"/>
+            </a:xfrm>
+            <a:prstGeom prst="roundRect">
+              <a:avLst/>
+            </a:prstGeom>
+          </p:spPr>
+          <p:style>
+            <a:lnRef idx="3">
+              <a:schemeClr val="lt1">
+                <a:hueOff val="0"/>
+                <a:satOff val="0"/>
+                <a:lumOff val="0"/>
+                <a:alphaOff val="0"/>
+              </a:schemeClr>
+            </a:lnRef>
+            <a:fillRef idx="1">
+              <a:schemeClr val="accent5">
+                <a:hueOff val="0"/>
+                <a:satOff val="0"/>
+                <a:lumOff val="0"/>
+                <a:alphaOff val="0"/>
+              </a:schemeClr>
+            </a:fillRef>
+            <a:effectRef idx="1">
+              <a:schemeClr val="accent5">
+                <a:hueOff val="0"/>
+                <a:satOff val="0"/>
+                <a:lumOff val="0"/>
+                <a:alphaOff val="0"/>
+              </a:schemeClr>
+            </a:effectRef>
+            <a:fontRef idx="minor">
+              <a:schemeClr val="lt1"/>
+            </a:fontRef>
+          </p:style>
+        </p:sp>
+        <p:sp>
+          <p:nvSpPr>
+            <p:cNvPr id="12" name="Rounded Rectangle 4"/>
+            <p:cNvSpPr txBox="1"/>
+            <p:nvPr/>
+          </p:nvSpPr>
+          <p:spPr>
+            <a:xfrm>
+              <a:off x="41623" y="2638905"/>
+              <a:ext cx="9213154" cy="769395"/>
+            </a:xfrm>
+            <a:prstGeom prst="rect">
+              <a:avLst/>
+            </a:prstGeom>
+          </p:spPr>
+          <p:style>
+            <a:lnRef idx="0">
+              <a:scrgbClr r="0" g="0" b="0"/>
+            </a:lnRef>
+            <a:fillRef idx="0">
+              <a:scrgbClr r="0" g="0" b="0"/>
+            </a:fillRef>
+            <a:effectRef idx="0">
+              <a:scrgbClr r="0" g="0" b="0"/>
+            </a:effectRef>
+            <a:fontRef idx="minor">
+              <a:schemeClr val="lt1"/>
+            </a:fontRef>
+          </p:style>
+          <p:txBody>
+            <a:bodyPr spcFirstLastPara="0" vert="horz" wrap="square" lIns="152400" tIns="152400" rIns="152400" bIns="152400" numCol="1" spcCol="1270" anchor="ctr" anchorCtr="0">
+              <a:noAutofit/>
+            </a:bodyPr>
+            <a:lstStyle/>
+            <a:p>
+              <a:pPr lvl="0" algn="ctr" defTabSz="1778000">
+                <a:lnSpc>
+                  <a:spcPct val="90000"/>
+                </a:lnSpc>
+                <a:spcBef>
+                  <a:spcPct val="0"/>
+                </a:spcBef>
+                <a:spcAft>
+                  <a:spcPct val="35000"/>
+                </a:spcAft>
+              </a:pPr>
+              <a:r>
+                <a:rPr lang="en-US" sz="2400" b="1" kern="1200" dirty="0">
+                  <a:latin typeface="Times New Roman" panose="02020603050405020304" pitchFamily="18" charset="0"/>
+                  <a:cs typeface="Times New Roman" panose="02020603050405020304" pitchFamily="18" charset="0"/>
+                </a:rPr>
+                <a:t>Section 4: Advantage of new model</a:t>
+              </a:r>
+            </a:p>
+          </p:txBody>
+        </p:sp>
+      </p:grpSp>
+      <p:pic>
+        <p:nvPicPr>
+          <p:cNvPr id="4" name="Picture 3"/>
+          <p:cNvPicPr>
+            <a:picLocks noChangeAspect="1"/>
+          </p:cNvPicPr>
+          <p:nvPr/>
+        </p:nvPicPr>
+        <p:blipFill>
+          <a:blip r:embed="rId3">
+            <a:extLst>
+              <a:ext uri="{28A0092B-C50C-407E-A947-70E740481C1C}">
+                <a14:useLocalDpi xmlns:a14="http://schemas.microsoft.com/office/drawing/2010/main" val="0"/>
+              </a:ext>
+            </a:extLst>
+          </a:blip>
+          <a:stretch>
+            <a:fillRect/>
+          </a:stretch>
+        </p:blipFill>
+        <p:spPr>
+          <a:xfrm>
+            <a:off x="1828800" y="1848803"/>
+            <a:ext cx="7454086" cy="4670307"/>
+          </a:xfrm>
+          <a:prstGeom prst="rect">
+            <a:avLst/>
+          </a:prstGeom>
+        </p:spPr>
+      </p:pic>
+    </p:spTree>
+    <p:extLst>
+      <p:ext uri="{BB962C8B-B14F-4D97-AF65-F5344CB8AC3E}">
+        <p14:creationId xmlns:p14="http://schemas.microsoft.com/office/powerpoint/2010/main" val="46397406"/>
+      </p:ext>
+    </p:extLst>
+  </p:cSld>
+  <p:clrMapOvr>
+    <a:masterClrMapping/>
+  </p:clrMapOvr>
+  <p:timing>
+    <p:tnLst>
+      <p:par>
+        <p:cTn id="1" dur="indefinite" restart="never" nodeType="tmRoot"/>
+      </p:par>
+    </p:tnLst>
+  </p:timing>
+</p:sld>
+</file>
+
+<file path=ppt/slides/slide25.xml><?xml version="1.0" encoding="utf-8"?>
+<p:sld xmlns:a="http://schemas.openxmlformats.org/drawingml/2006/main" xmlns:r="http://schemas.openxmlformats.org/officeDocument/2006/relationships" xmlns:p="http://schemas.openxmlformats.org/presentationml/2006/main">
+  <p:cSld>
+    <p:spTree>
+      <p:nvGrpSpPr>
+        <p:cNvPr id="1" name=""/>
+        <p:cNvGrpSpPr/>
+        <p:nvPr/>
+      </p:nvGrpSpPr>
+      <p:grpSpPr>
+        <a:xfrm>
+          <a:off x="0" y="0"/>
+          <a:ext cx="0" cy="0"/>
+          <a:chOff x="0" y="0"/>
+          <a:chExt cx="0" cy="0"/>
+        </a:xfrm>
+      </p:grpSpPr>
+      <p:sp>
+        <p:nvSpPr>
+          <p:cNvPr id="6" name="TextBox 5"/>
+          <p:cNvSpPr txBox="1"/>
+          <p:nvPr/>
+        </p:nvSpPr>
+        <p:spPr>
+          <a:xfrm>
+            <a:off x="626165" y="1264028"/>
+            <a:ext cx="10515600" cy="584775"/>
+          </a:xfrm>
+          <a:prstGeom prst="rect">
+            <a:avLst/>
+          </a:prstGeom>
+          <a:noFill/>
+        </p:spPr>
+        <p:txBody>
+          <a:bodyPr wrap="square" rtlCol="0">
+            <a:spAutoFit/>
+          </a:bodyPr>
+          <a:lstStyle/>
+          <a:p>
+            <a:pPr marL="457200" indent="-457200">
+              <a:buFont typeface="Wingdings" panose="05000000000000000000" pitchFamily="2" charset="2"/>
+              <a:buChar char="q"/>
+            </a:pPr>
+            <a:r>
+              <a:rPr lang="en-US" sz="3200" b="1" dirty="0" smtClean="0">
+                <a:solidFill>
+                  <a:schemeClr val="bg1"/>
+                </a:solidFill>
+                <a:latin typeface="Times New Roman" panose="02020603050405020304" pitchFamily="18" charset="0"/>
+                <a:cs typeface="Times New Roman" panose="02020603050405020304" pitchFamily="18" charset="0"/>
+              </a:rPr>
               <a:t>Detection</a:t>
             </a:r>
+            <a:endParaRPr lang="en-US" sz="3200" b="1" dirty="0">
+              <a:solidFill>
+                <a:schemeClr val="bg1"/>
+              </a:solidFill>
+              <a:latin typeface="Times New Roman" panose="02020603050405020304" pitchFamily="18" charset="0"/>
+              <a:cs typeface="Times New Roman" panose="02020603050405020304" pitchFamily="18" charset="0"/>
+            </a:endParaRPr>
           </a:p>
         </p:txBody>
       </p:sp>
@@ -24824,6 +26798,36 @@
           </p:txBody>
         </p:sp>
       </p:grpSp>
+      <p:pic>
+        <p:nvPicPr>
+          <p:cNvPr id="2" name="Picture 1"/>
+          <p:cNvPicPr>
+            <a:picLocks noChangeAspect="1"/>
+          </p:cNvPicPr>
+          <p:nvPr/>
+        </p:nvPicPr>
+        <p:blipFill>
+          <a:blip r:embed="rId3">
+            <a:extLst>
+              <a:ext uri="{28A0092B-C50C-407E-A947-70E740481C1C}">
+                <a14:useLocalDpi xmlns:a14="http://schemas.microsoft.com/office/drawing/2010/main" val="0"/>
+              </a:ext>
+            </a:extLst>
+          </a:blip>
+          <a:stretch>
+            <a:fillRect/>
+          </a:stretch>
+        </p:blipFill>
+        <p:spPr>
+          <a:xfrm>
+            <a:off x="304800" y="2057400"/>
+            <a:ext cx="11410950" cy="3200400"/>
+          </a:xfrm>
+          <a:prstGeom prst="rect">
+            <a:avLst/>
+          </a:prstGeom>
+        </p:spPr>
+      </p:pic>
     </p:spTree>
     <p:extLst>
       <p:ext uri="{BB962C8B-B14F-4D97-AF65-F5344CB8AC3E}">
@@ -24834,10 +26838,17 @@
   <p:clrMapOvr>
     <a:masterClrMapping/>
   </p:clrMapOvr>
+  <p:timing>
+    <p:tnLst>
+      <p:par>
+        <p:cTn id="1" dur="indefinite" restart="never" nodeType="tmRoot"/>
+      </p:par>
+    </p:tnLst>
+  </p:timing>
 </p:sld>
 </file>
 
-<file path=ppt/slides/slide25.xml><?xml version="1.0" encoding="utf-8"?>
+<file path=ppt/slides/slide26.xml><?xml version="1.0" encoding="utf-8"?>
 <p:sld xmlns:a="http://schemas.openxmlformats.org/drawingml/2006/main" xmlns:r="http://schemas.openxmlformats.org/officeDocument/2006/relationships" xmlns:p="http://schemas.openxmlformats.org/presentationml/2006/main">
   <p:cSld>
     <p:spTree>
@@ -25009,6 +27020,36 @@
           </p:txBody>
         </p:sp>
       </p:grpSp>
+      <p:pic>
+        <p:nvPicPr>
+          <p:cNvPr id="2" name="Picture 1"/>
+          <p:cNvPicPr>
+            <a:picLocks noChangeAspect="1"/>
+          </p:cNvPicPr>
+          <p:nvPr/>
+        </p:nvPicPr>
+        <p:blipFill>
+          <a:blip r:embed="rId3">
+            <a:extLst>
+              <a:ext uri="{28A0092B-C50C-407E-A947-70E740481C1C}">
+                <a14:useLocalDpi xmlns:a14="http://schemas.microsoft.com/office/drawing/2010/main" val="0"/>
+              </a:ext>
+            </a:extLst>
+          </a:blip>
+          <a:stretch>
+            <a:fillRect/>
+          </a:stretch>
+        </p:blipFill>
+        <p:spPr>
+          <a:xfrm>
+            <a:off x="626165" y="2153111"/>
+            <a:ext cx="10839450" cy="3390900"/>
+          </a:xfrm>
+          <a:prstGeom prst="rect">
+            <a:avLst/>
+          </a:prstGeom>
+        </p:spPr>
+      </p:pic>
     </p:spTree>
     <p:extLst>
       <p:ext uri="{BB962C8B-B14F-4D97-AF65-F5344CB8AC3E}">
@@ -25019,10 +27060,17 @@
   <p:clrMapOvr>
     <a:masterClrMapping/>
   </p:clrMapOvr>
+  <p:timing>
+    <p:tnLst>
+      <p:par>
+        <p:cTn id="1" dur="indefinite" restart="never" nodeType="tmRoot"/>
+      </p:par>
+    </p:tnLst>
+  </p:timing>
 </p:sld>
 </file>
 
-<file path=ppt/slides/slide26.xml><?xml version="1.0" encoding="utf-8"?>
+<file path=ppt/slides/slide27.xml><?xml version="1.0" encoding="utf-8"?>
 <p:sld xmlns:a="http://schemas.openxmlformats.org/drawingml/2006/main" xmlns:r="http://schemas.openxmlformats.org/officeDocument/2006/relationships" xmlns:p="http://schemas.openxmlformats.org/presentationml/2006/main">
   <p:cSld>
     <p:spTree>
@@ -25165,10 +27213,17 @@
   <p:clrMapOvr>
     <a:masterClrMapping/>
   </p:clrMapOvr>
+  <p:timing>
+    <p:tnLst>
+      <p:par>
+        <p:cTn id="1" dur="indefinite" restart="never" nodeType="tmRoot"/>
+      </p:par>
+    </p:tnLst>
+  </p:timing>
 </p:sld>
 </file>
 
-<file path=ppt/slides/slide27.xml><?xml version="1.0" encoding="utf-8"?>
+<file path=ppt/slides/slide28.xml><?xml version="1.0" encoding="utf-8"?>
 <p:sld xmlns:a="http://schemas.openxmlformats.org/drawingml/2006/main" xmlns:r="http://schemas.openxmlformats.org/officeDocument/2006/relationships" xmlns:p="http://schemas.openxmlformats.org/presentationml/2006/main">
   <p:cSld>
     <p:spTree>

</xml_diff>